<commit_message>
a few final tweaks
</commit_message>
<xml_diff>
--- a/github_workshop_slides.pptx
+++ b/github_workshop_slides.pptx
@@ -7175,54 +7175,54 @@
     </dgm:pt>
   </dgm:ptLst>
   <dgm:cxnLst>
+    <dgm:cxn modelId="{3EB62FD0-2257-864C-8663-FBD88D9630C8}" type="presOf" srcId="{B3177851-6EB1-4D34-91FE-4E690452D7BA}" destId="{648AF6B3-E6DB-4B1E-B09D-D39D6525EF7C}" srcOrd="0" destOrd="0" presId="urn:microsoft.com/office/officeart/2005/8/layout/orgChart1"/>
+    <dgm:cxn modelId="{70A7BEDD-693B-4DD1-9C83-55BBBE76215C}" srcId="{F839EE37-AAC3-4FA5-AD3B-EA73CC88A648}" destId="{78E6AD4F-347A-4F99-8FC7-232927552A24}" srcOrd="0" destOrd="0" parTransId="{133A30AB-63DB-4345-8C87-A092BED2B122}" sibTransId="{BCCF67E0-2EE2-4EC2-BF45-AC5F1A4A8F54}"/>
+    <dgm:cxn modelId="{1A08D7FB-5653-8142-8292-BB6F2D56A46B}" type="presOf" srcId="{ADC3EE65-F985-4FC1-BFD8-14C0B22E438F}" destId="{C61F81E7-F12A-4297-BB6D-DF74C40EC18A}" srcOrd="0" destOrd="0" presId="urn:microsoft.com/office/officeart/2005/8/layout/orgChart1"/>
+    <dgm:cxn modelId="{620E2FC9-D4F5-5841-ADDE-07A5839BDC69}" type="presOf" srcId="{7B583EF1-FCAE-4B9A-A5C8-F81CC6CA63BD}" destId="{7A95E3CB-9025-4CAF-8CC6-29EECC6A7D76}" srcOrd="0" destOrd="0" presId="urn:microsoft.com/office/officeart/2005/8/layout/orgChart1"/>
+    <dgm:cxn modelId="{FBD6B55C-3BF2-1E47-B517-C8CA3C6D7CCA}" type="presOf" srcId="{66992C1B-6E3F-4DCC-9C98-B505A8FF77FE}" destId="{042DEE46-144E-4F97-9AAD-12FD1102B775}" srcOrd="0" destOrd="0" presId="urn:microsoft.com/office/officeart/2005/8/layout/orgChart1"/>
+    <dgm:cxn modelId="{EC57A8DF-9971-1B4D-A582-917372306FB5}" type="presOf" srcId="{D5A65483-8A5B-45E4-822E-B11B31D06E7C}" destId="{32CC4FC2-CE9F-47A9-91BC-9FA89581F6AA}" srcOrd="0" destOrd="0" presId="urn:microsoft.com/office/officeart/2005/8/layout/orgChart1"/>
+    <dgm:cxn modelId="{66BEE586-1975-6540-A2E2-DD1BAF2485B6}" type="presOf" srcId="{5A781DD3-286B-4CA1-990F-4293EDCF8CE6}" destId="{3239088D-13FC-4BAE-A4B9-3BF5FE10AD00}" srcOrd="0" destOrd="0" presId="urn:microsoft.com/office/officeart/2005/8/layout/orgChart1"/>
+    <dgm:cxn modelId="{F6AC0B79-D095-544E-82C8-7036375E6057}" type="presOf" srcId="{1CDEBEEA-EDE8-4849-99BB-D68AF606269D}" destId="{885064D3-1501-481D-BD48-4A2F12691B03}" srcOrd="0" destOrd="0" presId="urn:microsoft.com/office/officeart/2005/8/layout/orgChart1"/>
+    <dgm:cxn modelId="{A6711C16-E9AC-4F5F-A8D6-3CB827AF55D6}" srcId="{F839EE37-AAC3-4FA5-AD3B-EA73CC88A648}" destId="{31C6FCEC-F029-4A4B-9F66-EC06A83F8384}" srcOrd="3" destOrd="0" parTransId="{328D9E3D-A268-43E3-9364-057464442A7A}" sibTransId="{DD3C8CF2-D181-4E01-9A74-3A7C34A23790}"/>
+    <dgm:cxn modelId="{565503FE-2541-AB46-8A8C-42FE77C3FB04}" type="presOf" srcId="{CAAA0ABC-2549-4981-8DE4-6F5DCBAAD8B2}" destId="{6DA40F89-E62B-4FCC-AE3E-00E7F46D3988}" srcOrd="0" destOrd="0" presId="urn:microsoft.com/office/officeart/2005/8/layout/orgChart1"/>
+    <dgm:cxn modelId="{37E2F0FF-5219-4748-9881-928427A3767B}" type="presOf" srcId="{CE52A87E-D9DC-42AB-A412-964F172D4B9D}" destId="{B0233FA0-AD44-4379-B1D1-C0C65789CA43}" srcOrd="1" destOrd="0" presId="urn:microsoft.com/office/officeart/2005/8/layout/orgChart1"/>
+    <dgm:cxn modelId="{71BF4D82-F556-084B-BCC7-F9A604F1D930}" type="presOf" srcId="{07D9F6E6-C312-45E9-801D-0E34B76035C6}" destId="{412EECAA-9C82-41A2-B9E1-4874E1FDF08D}" srcOrd="1" destOrd="0" presId="urn:microsoft.com/office/officeart/2005/8/layout/orgChart1"/>
+    <dgm:cxn modelId="{EFDB461F-7FA0-B543-82BB-718F788DAAED}" type="presOf" srcId="{CF8578A4-219E-4665-A429-90872ED8FCF4}" destId="{84F23C21-307C-4CA7-94C6-F637284A248F}" srcOrd="0" destOrd="0" presId="urn:microsoft.com/office/officeart/2005/8/layout/orgChart1"/>
+    <dgm:cxn modelId="{6886E6E0-A380-F643-81FF-9D61EB5E3273}" type="presOf" srcId="{C366E0D5-DE76-41F2-BB49-FFA6E1AAF58E}" destId="{0F4A088B-993F-4213-9936-8FF979AF9149}" srcOrd="0" destOrd="0" presId="urn:microsoft.com/office/officeart/2005/8/layout/orgChart1"/>
+    <dgm:cxn modelId="{8CC744ED-9257-4105-BDA6-5FF0057D3D49}" srcId="{66992C1B-6E3F-4DCC-9C98-B505A8FF77FE}" destId="{CF8578A4-219E-4665-A429-90872ED8FCF4}" srcOrd="1" destOrd="0" parTransId="{57600620-72A7-4CF9-92E0-8FB8BA2BA275}" sibTransId="{65155BDF-81F9-4B0C-B2AB-A96F0D65CEBE}"/>
+    <dgm:cxn modelId="{82F870E8-B774-1845-BE86-2EBBEC3C34B9}" type="presOf" srcId="{42EB0CB2-C8CB-436F-9B25-B300369EFA4F}" destId="{2A99A8CD-0C66-4FBC-8A63-FE349AD1B859}" srcOrd="0" destOrd="0" presId="urn:microsoft.com/office/officeart/2005/8/layout/orgChart1"/>
+    <dgm:cxn modelId="{02FDA5C2-482C-4C46-9FA7-298B7D417133}" type="presOf" srcId="{328D9E3D-A268-43E3-9364-057464442A7A}" destId="{8AF1F71C-8D01-4EB4-89D5-24DFF3E1612D}" srcOrd="0" destOrd="0" presId="urn:microsoft.com/office/officeart/2005/8/layout/orgChart1"/>
+    <dgm:cxn modelId="{203FCCEA-EF4A-E84A-89DD-879AB4E0C2F3}" type="presOf" srcId="{46CEAA11-2189-4337-A6B5-CBA0319EFCEE}" destId="{E5DC0FFD-9516-436D-9BC7-7D3F3A652D9C}" srcOrd="0" destOrd="0" presId="urn:microsoft.com/office/officeart/2005/8/layout/orgChart1"/>
+    <dgm:cxn modelId="{DD5F6121-41BB-B049-98A3-5C57FEF11D44}" type="presOf" srcId="{31C6FCEC-F029-4A4B-9F66-EC06A83F8384}" destId="{1971057D-DE6E-446F-AAB2-37541DB87212}" srcOrd="0" destOrd="0" presId="urn:microsoft.com/office/officeart/2005/8/layout/orgChart1"/>
+    <dgm:cxn modelId="{AFF81945-BCB3-9342-95A8-772879545DF7}" type="presOf" srcId="{66992C1B-6E3F-4DCC-9C98-B505A8FF77FE}" destId="{EB9E3E06-3871-4A30-A404-4B40FB3E9D52}" srcOrd="1" destOrd="0" presId="urn:microsoft.com/office/officeart/2005/8/layout/orgChart1"/>
+    <dgm:cxn modelId="{4DFC9BC2-C66E-4F4F-9DBD-E66CF53E8E87}" type="presOf" srcId="{78E6AD4F-347A-4F99-8FC7-232927552A24}" destId="{89C74F6A-853F-4966-A25E-1E2B377B728D}" srcOrd="0" destOrd="0" presId="urn:microsoft.com/office/officeart/2005/8/layout/orgChart1"/>
+    <dgm:cxn modelId="{291AC7DC-4BB0-458E-BEA0-32D2E6F1F785}" srcId="{ADC3EE65-F985-4FC1-BFD8-14C0B22E438F}" destId="{CAAA0ABC-2549-4981-8DE4-6F5DCBAAD8B2}" srcOrd="0" destOrd="0" parTransId="{1CDEBEEA-EDE8-4849-99BB-D68AF606269D}" sibTransId="{2F0244D6-AFD6-4B5D-A0D2-3F50DCEFF38A}"/>
+    <dgm:cxn modelId="{AFD2AD40-3180-A940-9937-BA06CC2AA412}" type="presOf" srcId="{11F42F33-E482-45ED-BE15-D4614959AB62}" destId="{B5014CE3-8A9C-4BA2-936D-31F7EE3BF698}" srcOrd="0" destOrd="0" presId="urn:microsoft.com/office/officeart/2005/8/layout/orgChart1"/>
+    <dgm:cxn modelId="{5827DE35-0D47-614B-8B76-8F22BF4F5152}" type="presOf" srcId="{F2B98D6A-2CA0-4E0C-8604-BABBF5F000CD}" destId="{6182ED39-AB22-4B27-9352-0AB52FB7F1E9}" srcOrd="1" destOrd="0" presId="urn:microsoft.com/office/officeart/2005/8/layout/orgChart1"/>
+    <dgm:cxn modelId="{4FBC0AF7-3FE9-7745-8709-7690A7C704ED}" type="presOf" srcId="{57600620-72A7-4CF9-92E0-8FB8BA2BA275}" destId="{76520364-5F6F-46FD-B4E3-810127C2505A}" srcOrd="0" destOrd="0" presId="urn:microsoft.com/office/officeart/2005/8/layout/orgChart1"/>
+    <dgm:cxn modelId="{13B69FC5-5FCF-B047-AB56-7C9BB67C349A}" type="presOf" srcId="{CAAA0ABC-2549-4981-8DE4-6F5DCBAAD8B2}" destId="{CD79120F-BF9B-46DF-877D-E72A306E2FDE}" srcOrd="1" destOrd="0" presId="urn:microsoft.com/office/officeart/2005/8/layout/orgChart1"/>
+    <dgm:cxn modelId="{2B556536-0B27-F54C-A683-B6FC1D3516DA}" type="presOf" srcId="{F2B98D6A-2CA0-4E0C-8604-BABBF5F000CD}" destId="{DBAFD0B1-1EDC-4A9C-A060-F06341BEC60D}" srcOrd="0" destOrd="0" presId="urn:microsoft.com/office/officeart/2005/8/layout/orgChart1"/>
+    <dgm:cxn modelId="{741DBA7E-4AC8-3646-A806-27F76E5D8849}" type="presOf" srcId="{E7440C44-FCD2-42F5-A20A-2B1C5F6A5DC7}" destId="{D5F69E44-5460-4F3D-A16B-1FAB1F568E60}" srcOrd="0" destOrd="0" presId="urn:microsoft.com/office/officeart/2005/8/layout/orgChart1"/>
+    <dgm:cxn modelId="{62B99504-8A7E-4414-82C0-FBC53D9BF7C4}" srcId="{66992C1B-6E3F-4DCC-9C98-B505A8FF77FE}" destId="{CE52A87E-D9DC-42AB-A412-964F172D4B9D}" srcOrd="0" destOrd="0" parTransId="{7B583EF1-FCAE-4B9A-A5C8-F81CC6CA63BD}" sibTransId="{9C08A609-D531-48E7-BA8A-90D2BB3D7070}"/>
+    <dgm:cxn modelId="{90F04FBA-34C7-6144-BF7F-3D862E9D9E78}" type="presOf" srcId="{ADC3EE65-F985-4FC1-BFD8-14C0B22E438F}" destId="{61D7EE8F-8214-4A83-B7B1-B6C98F11A3FE}" srcOrd="1" destOrd="0" presId="urn:microsoft.com/office/officeart/2005/8/layout/orgChart1"/>
+    <dgm:cxn modelId="{402C35EC-8190-4424-B321-1706C88CF423}" srcId="{31C6FCEC-F029-4A4B-9F66-EC06A83F8384}" destId="{ADC3EE65-F985-4FC1-BFD8-14C0B22E438F}" srcOrd="0" destOrd="0" parTransId="{E7440C44-FCD2-42F5-A20A-2B1C5F6A5DC7}" sibTransId="{EBCF3B0F-85AC-488C-A390-73D64F83CB02}"/>
+    <dgm:cxn modelId="{DFAFEA00-885B-1B48-B14F-44C59CF54172}" type="presOf" srcId="{B3177851-6EB1-4D34-91FE-4E690452D7BA}" destId="{855E71C9-D0E9-4DCF-96EE-5FF45EF7005C}" srcOrd="1" destOrd="0" presId="urn:microsoft.com/office/officeart/2005/8/layout/orgChart1"/>
+    <dgm:cxn modelId="{CEAB18AD-CE24-2246-8F0A-0ED2EA6A0187}" type="presOf" srcId="{07D9F6E6-C312-45E9-801D-0E34B76035C6}" destId="{08EEE261-903F-484D-8AC0-ED3C8A7B85D6}" srcOrd="0" destOrd="0" presId="urn:microsoft.com/office/officeart/2005/8/layout/orgChart1"/>
+    <dgm:cxn modelId="{635464FC-B1A9-EB40-99AF-A8F84B0393F1}" type="presOf" srcId="{11F42F33-E482-45ED-BE15-D4614959AB62}" destId="{23DE44C1-CCC8-491B-94A2-1215855ED29F}" srcOrd="1" destOrd="0" presId="urn:microsoft.com/office/officeart/2005/8/layout/orgChart1"/>
+    <dgm:cxn modelId="{4B7D79A2-D19D-41E4-99CC-0205E7EA1189}" srcId="{F839EE37-AAC3-4FA5-AD3B-EA73CC88A648}" destId="{66992C1B-6E3F-4DCC-9C98-B505A8FF77FE}" srcOrd="1" destOrd="0" parTransId="{C366E0D5-DE76-41F2-BB49-FFA6E1AAF58E}" sibTransId="{0B423D87-FE63-48CD-9DCB-DDA1031EEBCC}"/>
+    <dgm:cxn modelId="{C62AC971-10EB-454B-B96D-8ACFDFF8D80E}" srcId="{B3177851-6EB1-4D34-91FE-4E690452D7BA}" destId="{11F42F33-E482-45ED-BE15-D4614959AB62}" srcOrd="0" destOrd="0" parTransId="{2E5D146F-8078-495B-85A2-0E331AA12C3E}" sibTransId="{BE06ED79-1571-4065-BF7F-D883DAC76559}"/>
+    <dgm:cxn modelId="{2D8C6F06-465D-894A-A6D5-4EFD060C423A}" type="presOf" srcId="{CE52A87E-D9DC-42AB-A412-964F172D4B9D}" destId="{FE32EDE3-F446-4FCB-AB6F-0D3769826834}" srcOrd="0" destOrd="0" presId="urn:microsoft.com/office/officeart/2005/8/layout/orgChart1"/>
+    <dgm:cxn modelId="{950F43F0-8452-C343-9520-A8568F23C0A0}" type="presOf" srcId="{F839EE37-AAC3-4FA5-AD3B-EA73CC88A648}" destId="{B5555807-A1F5-4B5A-93C2-29868EDE5CA8}" srcOrd="1" destOrd="0" presId="urn:microsoft.com/office/officeart/2005/8/layout/orgChart1"/>
+    <dgm:cxn modelId="{BDF5F18F-2501-4671-8456-2BAEB26349EF}" srcId="{F2B98D6A-2CA0-4E0C-8604-BABBF5F000CD}" destId="{07D9F6E6-C312-45E9-801D-0E34B76035C6}" srcOrd="0" destOrd="0" parTransId="{5A781DD3-286B-4CA1-990F-4293EDCF8CE6}" sibTransId="{817C6BA0-F320-4CC2-87FD-CA9178EA4075}"/>
+    <dgm:cxn modelId="{F446E246-FD23-4048-B69A-A88C35CFC234}" type="presOf" srcId="{133A30AB-63DB-4345-8C87-A092BED2B122}" destId="{92DDC1F2-A09D-471F-AA46-883AB1B9D889}" srcOrd="0" destOrd="0" presId="urn:microsoft.com/office/officeart/2005/8/layout/orgChart1"/>
     <dgm:cxn modelId="{BF55FD58-124A-49A9-B1CD-CE96575EF2C6}" srcId="{F839EE37-AAC3-4FA5-AD3B-EA73CC88A648}" destId="{F2B98D6A-2CA0-4E0C-8604-BABBF5F000CD}" srcOrd="2" destOrd="0" parTransId="{42EB0CB2-C8CB-436F-9B25-B300369EFA4F}" sibTransId="{C173F737-03C0-46D4-B490-E7F70DAE20E7}"/>
-    <dgm:cxn modelId="{AFD2AD40-3180-A940-9937-BA06CC2AA412}" type="presOf" srcId="{11F42F33-E482-45ED-BE15-D4614959AB62}" destId="{B5014CE3-8A9C-4BA2-936D-31F7EE3BF698}" srcOrd="0" destOrd="0" presId="urn:microsoft.com/office/officeart/2005/8/layout/orgChart1"/>
-    <dgm:cxn modelId="{13B69FC5-5FCF-B047-AB56-7C9BB67C349A}" type="presOf" srcId="{CAAA0ABC-2549-4981-8DE4-6F5DCBAAD8B2}" destId="{CD79120F-BF9B-46DF-877D-E72A306E2FDE}" srcOrd="1" destOrd="0" presId="urn:microsoft.com/office/officeart/2005/8/layout/orgChart1"/>
-    <dgm:cxn modelId="{02FDA5C2-482C-4C46-9FA7-298B7D417133}" type="presOf" srcId="{328D9E3D-A268-43E3-9364-057464442A7A}" destId="{8AF1F71C-8D01-4EB4-89D5-24DFF3E1612D}" srcOrd="0" destOrd="0" presId="urn:microsoft.com/office/officeart/2005/8/layout/orgChart1"/>
-    <dgm:cxn modelId="{3EB62FD0-2257-864C-8663-FBD88D9630C8}" type="presOf" srcId="{B3177851-6EB1-4D34-91FE-4E690452D7BA}" destId="{648AF6B3-E6DB-4B1E-B09D-D39D6525EF7C}" srcOrd="0" destOrd="0" presId="urn:microsoft.com/office/officeart/2005/8/layout/orgChart1"/>
-    <dgm:cxn modelId="{DD5F6121-41BB-B049-98A3-5C57FEF11D44}" type="presOf" srcId="{31C6FCEC-F029-4A4B-9F66-EC06A83F8384}" destId="{1971057D-DE6E-446F-AAB2-37541DB87212}" srcOrd="0" destOrd="0" presId="urn:microsoft.com/office/officeart/2005/8/layout/orgChart1"/>
-    <dgm:cxn modelId="{620E2FC9-D4F5-5841-ADDE-07A5839BDC69}" type="presOf" srcId="{7B583EF1-FCAE-4B9A-A5C8-F81CC6CA63BD}" destId="{7A95E3CB-9025-4CAF-8CC6-29EECC6A7D76}" srcOrd="0" destOrd="0" presId="urn:microsoft.com/office/officeart/2005/8/layout/orgChart1"/>
-    <dgm:cxn modelId="{4DFC9BC2-C66E-4F4F-9DBD-E66CF53E8E87}" type="presOf" srcId="{78E6AD4F-347A-4F99-8FC7-232927552A24}" destId="{89C74F6A-853F-4966-A25E-1E2B377B728D}" srcOrd="0" destOrd="0" presId="urn:microsoft.com/office/officeart/2005/8/layout/orgChart1"/>
+    <dgm:cxn modelId="{AAF06561-E161-4F47-8ACC-1AFE33CF6B7D}" type="presOf" srcId="{F839EE37-AAC3-4FA5-AD3B-EA73CC88A648}" destId="{E80EDD09-92C8-49D8-B9EB-C448BC64713F}" srcOrd="0" destOrd="0" presId="urn:microsoft.com/office/officeart/2005/8/layout/orgChart1"/>
+    <dgm:cxn modelId="{77B2832C-9AE8-0D4C-9D23-DED37474F4FD}" type="presOf" srcId="{2E5D146F-8078-495B-85A2-0E331AA12C3E}" destId="{853AAD8C-75C0-4E7E-A44F-7B66A0CFB1AF}" srcOrd="0" destOrd="0" presId="urn:microsoft.com/office/officeart/2005/8/layout/orgChart1"/>
+    <dgm:cxn modelId="{3AFFBF39-95B9-4C47-A282-47E8A5840A3F}" type="presOf" srcId="{31C6FCEC-F029-4A4B-9F66-EC06A83F8384}" destId="{5C8954ED-4F39-424E-AC8F-2F9EC6B047FC}" srcOrd="1" destOrd="0" presId="urn:microsoft.com/office/officeart/2005/8/layout/orgChart1"/>
+    <dgm:cxn modelId="{3FCA5416-877A-438F-B369-43D0AA854F11}" srcId="{CE52A87E-D9DC-42AB-A412-964F172D4B9D}" destId="{B3177851-6EB1-4D34-91FE-4E690452D7BA}" srcOrd="0" destOrd="0" parTransId="{D5A65483-8A5B-45E4-822E-B11B31D06E7C}" sibTransId="{18FC5810-8EE0-4CA6-9E9B-AA4CC4D7836F}"/>
+    <dgm:cxn modelId="{A07E84A1-5C7F-446F-9953-B9A7677E5A09}" srcId="{46CEAA11-2189-4337-A6B5-CBA0319EFCEE}" destId="{F839EE37-AAC3-4FA5-AD3B-EA73CC88A648}" srcOrd="0" destOrd="0" parTransId="{710DCB2C-9D9C-436B-975C-0D5EA6E01AFC}" sibTransId="{5E9A7EEF-DEE4-45A9-A63C-95860C110C21}"/>
     <dgm:cxn modelId="{4646A001-FFF6-4E40-9B2C-B9780CCA8A60}" type="presOf" srcId="{CF8578A4-219E-4665-A429-90872ED8FCF4}" destId="{636D6F14-1291-4FD1-BC43-679F020BD9F1}" srcOrd="1" destOrd="0" presId="urn:microsoft.com/office/officeart/2005/8/layout/orgChart1"/>
-    <dgm:cxn modelId="{DFAFEA00-885B-1B48-B14F-44C59CF54172}" type="presOf" srcId="{B3177851-6EB1-4D34-91FE-4E690452D7BA}" destId="{855E71C9-D0E9-4DCF-96EE-5FF45EF7005C}" srcOrd="1" destOrd="0" presId="urn:microsoft.com/office/officeart/2005/8/layout/orgChart1"/>
-    <dgm:cxn modelId="{635464FC-B1A9-EB40-99AF-A8F84B0393F1}" type="presOf" srcId="{11F42F33-E482-45ED-BE15-D4614959AB62}" destId="{23DE44C1-CCC8-491B-94A2-1215855ED29F}" srcOrd="1" destOrd="0" presId="urn:microsoft.com/office/officeart/2005/8/layout/orgChart1"/>
-    <dgm:cxn modelId="{8CC744ED-9257-4105-BDA6-5FF0057D3D49}" srcId="{66992C1B-6E3F-4DCC-9C98-B505A8FF77FE}" destId="{CF8578A4-219E-4665-A429-90872ED8FCF4}" srcOrd="1" destOrd="0" parTransId="{57600620-72A7-4CF9-92E0-8FB8BA2BA275}" sibTransId="{65155BDF-81F9-4B0C-B2AB-A96F0D65CEBE}"/>
-    <dgm:cxn modelId="{6886E6E0-A380-F643-81FF-9D61EB5E3273}" type="presOf" srcId="{C366E0D5-DE76-41F2-BB49-FFA6E1AAF58E}" destId="{0F4A088B-993F-4213-9936-8FF979AF9149}" srcOrd="0" destOrd="0" presId="urn:microsoft.com/office/officeart/2005/8/layout/orgChart1"/>
-    <dgm:cxn modelId="{AAF06561-E161-4F47-8ACC-1AFE33CF6B7D}" type="presOf" srcId="{F839EE37-AAC3-4FA5-AD3B-EA73CC88A648}" destId="{E80EDD09-92C8-49D8-B9EB-C448BC64713F}" srcOrd="0" destOrd="0" presId="urn:microsoft.com/office/officeart/2005/8/layout/orgChart1"/>
-    <dgm:cxn modelId="{A6711C16-E9AC-4F5F-A8D6-3CB827AF55D6}" srcId="{F839EE37-AAC3-4FA5-AD3B-EA73CC88A648}" destId="{31C6FCEC-F029-4A4B-9F66-EC06A83F8384}" srcOrd="3" destOrd="0" parTransId="{328D9E3D-A268-43E3-9364-057464442A7A}" sibTransId="{DD3C8CF2-D181-4E01-9A74-3A7C34A23790}"/>
-    <dgm:cxn modelId="{741DBA7E-4AC8-3646-A806-27F76E5D8849}" type="presOf" srcId="{E7440C44-FCD2-42F5-A20A-2B1C5F6A5DC7}" destId="{D5F69E44-5460-4F3D-A16B-1FAB1F568E60}" srcOrd="0" destOrd="0" presId="urn:microsoft.com/office/officeart/2005/8/layout/orgChart1"/>
-    <dgm:cxn modelId="{EFDB461F-7FA0-B543-82BB-718F788DAAED}" type="presOf" srcId="{CF8578A4-219E-4665-A429-90872ED8FCF4}" destId="{84F23C21-307C-4CA7-94C6-F637284A248F}" srcOrd="0" destOrd="0" presId="urn:microsoft.com/office/officeart/2005/8/layout/orgChart1"/>
     <dgm:cxn modelId="{70BA8A86-5941-CA4B-AB1D-03C19BB87BEA}" type="presOf" srcId="{78E6AD4F-347A-4F99-8FC7-232927552A24}" destId="{D09695F6-6F0C-4580-827F-7DA78F7377E7}" srcOrd="1" destOrd="0" presId="urn:microsoft.com/office/officeart/2005/8/layout/orgChart1"/>
-    <dgm:cxn modelId="{62B99504-8A7E-4414-82C0-FBC53D9BF7C4}" srcId="{66992C1B-6E3F-4DCC-9C98-B505A8FF77FE}" destId="{CE52A87E-D9DC-42AB-A412-964F172D4B9D}" srcOrd="0" destOrd="0" parTransId="{7B583EF1-FCAE-4B9A-A5C8-F81CC6CA63BD}" sibTransId="{9C08A609-D531-48E7-BA8A-90D2BB3D7070}"/>
-    <dgm:cxn modelId="{4B7D79A2-D19D-41E4-99CC-0205E7EA1189}" srcId="{F839EE37-AAC3-4FA5-AD3B-EA73CC88A648}" destId="{66992C1B-6E3F-4DCC-9C98-B505A8FF77FE}" srcOrd="1" destOrd="0" parTransId="{C366E0D5-DE76-41F2-BB49-FFA6E1AAF58E}" sibTransId="{0B423D87-FE63-48CD-9DCB-DDA1031EEBCC}"/>
-    <dgm:cxn modelId="{90F04FBA-34C7-6144-BF7F-3D862E9D9E78}" type="presOf" srcId="{ADC3EE65-F985-4FC1-BFD8-14C0B22E438F}" destId="{61D7EE8F-8214-4A83-B7B1-B6C98F11A3FE}" srcOrd="1" destOrd="0" presId="urn:microsoft.com/office/officeart/2005/8/layout/orgChart1"/>
-    <dgm:cxn modelId="{FBD6B55C-3BF2-1E47-B517-C8CA3C6D7CCA}" type="presOf" srcId="{66992C1B-6E3F-4DCC-9C98-B505A8FF77FE}" destId="{042DEE46-144E-4F97-9AAD-12FD1102B775}" srcOrd="0" destOrd="0" presId="urn:microsoft.com/office/officeart/2005/8/layout/orgChart1"/>
-    <dgm:cxn modelId="{82F870E8-B774-1845-BE86-2EBBEC3C34B9}" type="presOf" srcId="{42EB0CB2-C8CB-436F-9B25-B300369EFA4F}" destId="{2A99A8CD-0C66-4FBC-8A63-FE349AD1B859}" srcOrd="0" destOrd="0" presId="urn:microsoft.com/office/officeart/2005/8/layout/orgChart1"/>
-    <dgm:cxn modelId="{402C35EC-8190-4424-B321-1706C88CF423}" srcId="{31C6FCEC-F029-4A4B-9F66-EC06A83F8384}" destId="{ADC3EE65-F985-4FC1-BFD8-14C0B22E438F}" srcOrd="0" destOrd="0" parTransId="{E7440C44-FCD2-42F5-A20A-2B1C5F6A5DC7}" sibTransId="{EBCF3B0F-85AC-488C-A390-73D64F83CB02}"/>
-    <dgm:cxn modelId="{C62AC971-10EB-454B-B96D-8ACFDFF8D80E}" srcId="{B3177851-6EB1-4D34-91FE-4E690452D7BA}" destId="{11F42F33-E482-45ED-BE15-D4614959AB62}" srcOrd="0" destOrd="0" parTransId="{2E5D146F-8078-495B-85A2-0E331AA12C3E}" sibTransId="{BE06ED79-1571-4065-BF7F-D883DAC76559}"/>
-    <dgm:cxn modelId="{BDF5F18F-2501-4671-8456-2BAEB26349EF}" srcId="{F2B98D6A-2CA0-4E0C-8604-BABBF5F000CD}" destId="{07D9F6E6-C312-45E9-801D-0E34B76035C6}" srcOrd="0" destOrd="0" parTransId="{5A781DD3-286B-4CA1-990F-4293EDCF8CE6}" sibTransId="{817C6BA0-F320-4CC2-87FD-CA9178EA4075}"/>
-    <dgm:cxn modelId="{3FCA5416-877A-438F-B369-43D0AA854F11}" srcId="{CE52A87E-D9DC-42AB-A412-964F172D4B9D}" destId="{B3177851-6EB1-4D34-91FE-4E690452D7BA}" srcOrd="0" destOrd="0" parTransId="{D5A65483-8A5B-45E4-822E-B11B31D06E7C}" sibTransId="{18FC5810-8EE0-4CA6-9E9B-AA4CC4D7836F}"/>
-    <dgm:cxn modelId="{F6AC0B79-D095-544E-82C8-7036375E6057}" type="presOf" srcId="{1CDEBEEA-EDE8-4849-99BB-D68AF606269D}" destId="{885064D3-1501-481D-BD48-4A2F12691B03}" srcOrd="0" destOrd="0" presId="urn:microsoft.com/office/officeart/2005/8/layout/orgChart1"/>
-    <dgm:cxn modelId="{3AFFBF39-95B9-4C47-A282-47E8A5840A3F}" type="presOf" srcId="{31C6FCEC-F029-4A4B-9F66-EC06A83F8384}" destId="{5C8954ED-4F39-424E-AC8F-2F9EC6B047FC}" srcOrd="1" destOrd="0" presId="urn:microsoft.com/office/officeart/2005/8/layout/orgChart1"/>
-    <dgm:cxn modelId="{291AC7DC-4BB0-458E-BEA0-32D2E6F1F785}" srcId="{ADC3EE65-F985-4FC1-BFD8-14C0B22E438F}" destId="{CAAA0ABC-2549-4981-8DE4-6F5DCBAAD8B2}" srcOrd="0" destOrd="0" parTransId="{1CDEBEEA-EDE8-4849-99BB-D68AF606269D}" sibTransId="{2F0244D6-AFD6-4B5D-A0D2-3F50DCEFF38A}"/>
-    <dgm:cxn modelId="{37E2F0FF-5219-4748-9881-928427A3767B}" type="presOf" srcId="{CE52A87E-D9DC-42AB-A412-964F172D4B9D}" destId="{B0233FA0-AD44-4379-B1D1-C0C65789CA43}" srcOrd="1" destOrd="0" presId="urn:microsoft.com/office/officeart/2005/8/layout/orgChart1"/>
-    <dgm:cxn modelId="{EC57A8DF-9971-1B4D-A582-917372306FB5}" type="presOf" srcId="{D5A65483-8A5B-45E4-822E-B11B31D06E7C}" destId="{32CC4FC2-CE9F-47A9-91BC-9FA89581F6AA}" srcOrd="0" destOrd="0" presId="urn:microsoft.com/office/officeart/2005/8/layout/orgChart1"/>
-    <dgm:cxn modelId="{4FBC0AF7-3FE9-7745-8709-7690A7C704ED}" type="presOf" srcId="{57600620-72A7-4CF9-92E0-8FB8BA2BA275}" destId="{76520364-5F6F-46FD-B4E3-810127C2505A}" srcOrd="0" destOrd="0" presId="urn:microsoft.com/office/officeart/2005/8/layout/orgChart1"/>
-    <dgm:cxn modelId="{70A7BEDD-693B-4DD1-9C83-55BBBE76215C}" srcId="{F839EE37-AAC3-4FA5-AD3B-EA73CC88A648}" destId="{78E6AD4F-347A-4F99-8FC7-232927552A24}" srcOrd="0" destOrd="0" parTransId="{133A30AB-63DB-4345-8C87-A092BED2B122}" sibTransId="{BCCF67E0-2EE2-4EC2-BF45-AC5F1A4A8F54}"/>
-    <dgm:cxn modelId="{203FCCEA-EF4A-E84A-89DD-879AB4E0C2F3}" type="presOf" srcId="{46CEAA11-2189-4337-A6B5-CBA0319EFCEE}" destId="{E5DC0FFD-9516-436D-9BC7-7D3F3A652D9C}" srcOrd="0" destOrd="0" presId="urn:microsoft.com/office/officeart/2005/8/layout/orgChart1"/>
-    <dgm:cxn modelId="{AFF81945-BCB3-9342-95A8-772879545DF7}" type="presOf" srcId="{66992C1B-6E3F-4DCC-9C98-B505A8FF77FE}" destId="{EB9E3E06-3871-4A30-A404-4B40FB3E9D52}" srcOrd="1" destOrd="0" presId="urn:microsoft.com/office/officeart/2005/8/layout/orgChart1"/>
-    <dgm:cxn modelId="{565503FE-2541-AB46-8A8C-42FE77C3FB04}" type="presOf" srcId="{CAAA0ABC-2549-4981-8DE4-6F5DCBAAD8B2}" destId="{6DA40F89-E62B-4FCC-AE3E-00E7F46D3988}" srcOrd="0" destOrd="0" presId="urn:microsoft.com/office/officeart/2005/8/layout/orgChart1"/>
-    <dgm:cxn modelId="{CEAB18AD-CE24-2246-8F0A-0ED2EA6A0187}" type="presOf" srcId="{07D9F6E6-C312-45E9-801D-0E34B76035C6}" destId="{08EEE261-903F-484D-8AC0-ED3C8A7B85D6}" srcOrd="0" destOrd="0" presId="urn:microsoft.com/office/officeart/2005/8/layout/orgChart1"/>
-    <dgm:cxn modelId="{F446E246-FD23-4048-B69A-A88C35CFC234}" type="presOf" srcId="{133A30AB-63DB-4345-8C87-A092BED2B122}" destId="{92DDC1F2-A09D-471F-AA46-883AB1B9D889}" srcOrd="0" destOrd="0" presId="urn:microsoft.com/office/officeart/2005/8/layout/orgChart1"/>
-    <dgm:cxn modelId="{2B556536-0B27-F54C-A683-B6FC1D3516DA}" type="presOf" srcId="{F2B98D6A-2CA0-4E0C-8604-BABBF5F000CD}" destId="{DBAFD0B1-1EDC-4A9C-A060-F06341BEC60D}" srcOrd="0" destOrd="0" presId="urn:microsoft.com/office/officeart/2005/8/layout/orgChart1"/>
-    <dgm:cxn modelId="{66BEE586-1975-6540-A2E2-DD1BAF2485B6}" type="presOf" srcId="{5A781DD3-286B-4CA1-990F-4293EDCF8CE6}" destId="{3239088D-13FC-4BAE-A4B9-3BF5FE10AD00}" srcOrd="0" destOrd="0" presId="urn:microsoft.com/office/officeart/2005/8/layout/orgChart1"/>
-    <dgm:cxn modelId="{71BF4D82-F556-084B-BCC7-F9A604F1D930}" type="presOf" srcId="{07D9F6E6-C312-45E9-801D-0E34B76035C6}" destId="{412EECAA-9C82-41A2-B9E1-4874E1FDF08D}" srcOrd="1" destOrd="0" presId="urn:microsoft.com/office/officeart/2005/8/layout/orgChart1"/>
-    <dgm:cxn modelId="{A07E84A1-5C7F-446F-9953-B9A7677E5A09}" srcId="{46CEAA11-2189-4337-A6B5-CBA0319EFCEE}" destId="{F839EE37-AAC3-4FA5-AD3B-EA73CC88A648}" srcOrd="0" destOrd="0" parTransId="{710DCB2C-9D9C-436B-975C-0D5EA6E01AFC}" sibTransId="{5E9A7EEF-DEE4-45A9-A63C-95860C110C21}"/>
-    <dgm:cxn modelId="{5827DE35-0D47-614B-8B76-8F22BF4F5152}" type="presOf" srcId="{F2B98D6A-2CA0-4E0C-8604-BABBF5F000CD}" destId="{6182ED39-AB22-4B27-9352-0AB52FB7F1E9}" srcOrd="1" destOrd="0" presId="urn:microsoft.com/office/officeart/2005/8/layout/orgChart1"/>
-    <dgm:cxn modelId="{950F43F0-8452-C343-9520-A8568F23C0A0}" type="presOf" srcId="{F839EE37-AAC3-4FA5-AD3B-EA73CC88A648}" destId="{B5555807-A1F5-4B5A-93C2-29868EDE5CA8}" srcOrd="1" destOrd="0" presId="urn:microsoft.com/office/officeart/2005/8/layout/orgChart1"/>
-    <dgm:cxn modelId="{77B2832C-9AE8-0D4C-9D23-DED37474F4FD}" type="presOf" srcId="{2E5D146F-8078-495B-85A2-0E331AA12C3E}" destId="{853AAD8C-75C0-4E7E-A44F-7B66A0CFB1AF}" srcOrd="0" destOrd="0" presId="urn:microsoft.com/office/officeart/2005/8/layout/orgChart1"/>
-    <dgm:cxn modelId="{1A08D7FB-5653-8142-8292-BB6F2D56A46B}" type="presOf" srcId="{ADC3EE65-F985-4FC1-BFD8-14C0B22E438F}" destId="{C61F81E7-F12A-4297-BB6D-DF74C40EC18A}" srcOrd="0" destOrd="0" presId="urn:microsoft.com/office/officeart/2005/8/layout/orgChart1"/>
-    <dgm:cxn modelId="{2D8C6F06-465D-894A-A6D5-4EFD060C423A}" type="presOf" srcId="{CE52A87E-D9DC-42AB-A412-964F172D4B9D}" destId="{FE32EDE3-F446-4FCB-AB6F-0D3769826834}" srcOrd="0" destOrd="0" presId="urn:microsoft.com/office/officeart/2005/8/layout/orgChart1"/>
     <dgm:cxn modelId="{1567EB9E-15F3-C24D-A5A9-D679D68F6C46}" type="presParOf" srcId="{E5DC0FFD-9516-436D-9BC7-7D3F3A652D9C}" destId="{ADEAD67C-2513-406B-943A-35913B039F8C}" srcOrd="0" destOrd="0" presId="urn:microsoft.com/office/officeart/2005/8/layout/orgChart1"/>
     <dgm:cxn modelId="{C828F1FF-24D2-6148-86E1-A504BE948A73}" type="presParOf" srcId="{ADEAD67C-2513-406B-943A-35913B039F8C}" destId="{63534E00-9DA4-4593-A305-19E292E49D06}" srcOrd="0" destOrd="0" presId="urn:microsoft.com/office/officeart/2005/8/layout/orgChart1"/>
     <dgm:cxn modelId="{2C89F157-F820-E143-8818-F40B047E4BBA}" type="presParOf" srcId="{63534E00-9DA4-4593-A305-19E292E49D06}" destId="{E80EDD09-92C8-49D8-B9EB-C448BC64713F}" srcOrd="0" destOrd="0" presId="urn:microsoft.com/office/officeart/2005/8/layout/orgChart1"/>
@@ -7692,26 +7692,6 @@
     <dgm:pt modelId="{1AC5FD1E-3656-1049-AF26-BE3335955D52}" type="pres">
       <dgm:prSet presAssocID="{384EC59C-28A8-FD4A-BE76-AC3C762AA11A}" presName="Name37" presStyleLbl="parChTrans1D2" presStyleIdx="0" presStyleCnt="3"/>
       <dgm:spPr/>
-    </dgm:pt>
-    <dgm:pt modelId="{DC79463A-F520-DD49-851F-368F651BD7EC}" type="pres">
-      <dgm:prSet presAssocID="{A7DBECA3-F8EB-FB43-A7B7-7C5690B85239}" presName="hierRoot2" presStyleCnt="0">
-        <dgm:presLayoutVars>
-          <dgm:hierBranch val="init"/>
-        </dgm:presLayoutVars>
-      </dgm:prSet>
-      <dgm:spPr/>
-    </dgm:pt>
-    <dgm:pt modelId="{04E2AE2D-A784-9D42-9BDC-7D6AD4569B52}" type="pres">
-      <dgm:prSet presAssocID="{A7DBECA3-F8EB-FB43-A7B7-7C5690B85239}" presName="rootComposite" presStyleCnt="0"/>
-      <dgm:spPr/>
-    </dgm:pt>
-    <dgm:pt modelId="{5E76C677-F7E4-DD40-A3BF-53EDF2E9AAC3}" type="pres">
-      <dgm:prSet presAssocID="{A7DBECA3-F8EB-FB43-A7B7-7C5690B85239}" presName="rootText" presStyleLbl="node2" presStyleIdx="0" presStyleCnt="3">
-        <dgm:presLayoutVars>
-          <dgm:chPref val="3"/>
-        </dgm:presLayoutVars>
-      </dgm:prSet>
-      <dgm:spPr/>
       <dgm:t>
         <a:bodyPr/>
         <a:lstStyle/>
@@ -7720,8 +7700,24 @@
         </a:p>
       </dgm:t>
     </dgm:pt>
-    <dgm:pt modelId="{5CE8B228-FCE6-EB4F-8E39-9849546C0FAA}" type="pres">
-      <dgm:prSet presAssocID="{A7DBECA3-F8EB-FB43-A7B7-7C5690B85239}" presName="rootConnector" presStyleLbl="node2" presStyleIdx="0" presStyleCnt="3"/>
+    <dgm:pt modelId="{DC79463A-F520-DD49-851F-368F651BD7EC}" type="pres">
+      <dgm:prSet presAssocID="{A7DBECA3-F8EB-FB43-A7B7-7C5690B85239}" presName="hierRoot2" presStyleCnt="0">
+        <dgm:presLayoutVars>
+          <dgm:hierBranch val="init"/>
+        </dgm:presLayoutVars>
+      </dgm:prSet>
+      <dgm:spPr/>
+    </dgm:pt>
+    <dgm:pt modelId="{04E2AE2D-A784-9D42-9BDC-7D6AD4569B52}" type="pres">
+      <dgm:prSet presAssocID="{A7DBECA3-F8EB-FB43-A7B7-7C5690B85239}" presName="rootComposite" presStyleCnt="0"/>
+      <dgm:spPr/>
+    </dgm:pt>
+    <dgm:pt modelId="{5E76C677-F7E4-DD40-A3BF-53EDF2E9AAC3}" type="pres">
+      <dgm:prSet presAssocID="{A7DBECA3-F8EB-FB43-A7B7-7C5690B85239}" presName="rootText" presStyleLbl="node2" presStyleIdx="0" presStyleCnt="3">
+        <dgm:presLayoutVars>
+          <dgm:chPref val="3"/>
+        </dgm:presLayoutVars>
+      </dgm:prSet>
       <dgm:spPr/>
       <dgm:t>
         <a:bodyPr/>
@@ -7731,32 +7727,8 @@
         </a:p>
       </dgm:t>
     </dgm:pt>
-    <dgm:pt modelId="{FAC04A0A-9C3B-1F42-82EB-B3D62E532AA0}" type="pres">
-      <dgm:prSet presAssocID="{A7DBECA3-F8EB-FB43-A7B7-7C5690B85239}" presName="hierChild4" presStyleCnt="0"/>
-      <dgm:spPr/>
-    </dgm:pt>
-    <dgm:pt modelId="{C1F458B3-EDBB-D94A-A8A4-629CCD2AFC78}" type="pres">
-      <dgm:prSet presAssocID="{DA1F5B71-0C82-BC40-9676-093E6CEDE508}" presName="Name37" presStyleLbl="parChTrans1D3" presStyleIdx="0" presStyleCnt="2"/>
-      <dgm:spPr/>
-    </dgm:pt>
-    <dgm:pt modelId="{F1EDB1BA-43E8-9E4C-8A6D-4C1A6809AA05}" type="pres">
-      <dgm:prSet presAssocID="{E99DAD9F-9BF8-D241-8920-345630EDB1F1}" presName="hierRoot2" presStyleCnt="0">
-        <dgm:presLayoutVars>
-          <dgm:hierBranch val="init"/>
-        </dgm:presLayoutVars>
-      </dgm:prSet>
-      <dgm:spPr/>
-    </dgm:pt>
-    <dgm:pt modelId="{E0BC3A88-5FE9-A34B-B44E-D9687A1D7B45}" type="pres">
-      <dgm:prSet presAssocID="{E99DAD9F-9BF8-D241-8920-345630EDB1F1}" presName="rootComposite" presStyleCnt="0"/>
-      <dgm:spPr/>
-    </dgm:pt>
-    <dgm:pt modelId="{D6BD30AB-FC6C-184C-A8D7-70BFD5498C08}" type="pres">
-      <dgm:prSet presAssocID="{E99DAD9F-9BF8-D241-8920-345630EDB1F1}" presName="rootText" presStyleLbl="node3" presStyleIdx="0" presStyleCnt="2">
-        <dgm:presLayoutVars>
-          <dgm:chPref val="3"/>
-        </dgm:presLayoutVars>
-      </dgm:prSet>
+    <dgm:pt modelId="{5CE8B228-FCE6-EB4F-8E39-9849546C0FAA}" type="pres">
+      <dgm:prSet presAssocID="{A7DBECA3-F8EB-FB43-A7B7-7C5690B85239}" presName="rootConnector" presStyleLbl="node2" presStyleIdx="0" presStyleCnt="3"/>
       <dgm:spPr/>
       <dgm:t>
         <a:bodyPr/>
@@ -7766,8 +7738,12 @@
         </a:p>
       </dgm:t>
     </dgm:pt>
-    <dgm:pt modelId="{194228D9-180D-564D-87E6-922248B1F9B4}" type="pres">
-      <dgm:prSet presAssocID="{E99DAD9F-9BF8-D241-8920-345630EDB1F1}" presName="rootConnector" presStyleLbl="node3" presStyleIdx="0" presStyleCnt="2"/>
+    <dgm:pt modelId="{FAC04A0A-9C3B-1F42-82EB-B3D62E532AA0}" type="pres">
+      <dgm:prSet presAssocID="{A7DBECA3-F8EB-FB43-A7B7-7C5690B85239}" presName="hierChild4" presStyleCnt="0"/>
+      <dgm:spPr/>
+    </dgm:pt>
+    <dgm:pt modelId="{C1F458B3-EDBB-D94A-A8A4-629CCD2AFC78}" type="pres">
+      <dgm:prSet presAssocID="{DA1F5B71-0C82-BC40-9676-093E6CEDE508}" presName="Name37" presStyleLbl="parChTrans1D3" presStyleIdx="0" presStyleCnt="2"/>
       <dgm:spPr/>
       <dgm:t>
         <a:bodyPr/>
@@ -7777,28 +7753,20 @@
         </a:p>
       </dgm:t>
     </dgm:pt>
-    <dgm:pt modelId="{7F33F7F6-1C91-3942-9C20-54ED323D517F}" type="pres">
-      <dgm:prSet presAssocID="{E99DAD9F-9BF8-D241-8920-345630EDB1F1}" presName="hierChild4" presStyleCnt="0"/>
-      <dgm:spPr/>
-    </dgm:pt>
-    <dgm:pt modelId="{57DA398E-547C-4A44-8724-213247DC0F7D}" type="pres">
-      <dgm:prSet presAssocID="{3555AAF5-7204-E743-BD4A-2C190B923AAB}" presName="Name37" presStyleLbl="parChTrans1D4" presStyleIdx="0" presStyleCnt="2"/>
-      <dgm:spPr/>
-    </dgm:pt>
-    <dgm:pt modelId="{BE66BCB4-12B0-1F4A-82F9-040143877865}" type="pres">
-      <dgm:prSet presAssocID="{D85D4967-9970-2A45-894D-8D84143E9357}" presName="hierRoot2" presStyleCnt="0">
+    <dgm:pt modelId="{F1EDB1BA-43E8-9E4C-8A6D-4C1A6809AA05}" type="pres">
+      <dgm:prSet presAssocID="{E99DAD9F-9BF8-D241-8920-345630EDB1F1}" presName="hierRoot2" presStyleCnt="0">
         <dgm:presLayoutVars>
           <dgm:hierBranch val="init"/>
         </dgm:presLayoutVars>
       </dgm:prSet>
       <dgm:spPr/>
     </dgm:pt>
-    <dgm:pt modelId="{CA88E305-1CCB-3D4F-90E6-BA0A084B7F8F}" type="pres">
-      <dgm:prSet presAssocID="{D85D4967-9970-2A45-894D-8D84143E9357}" presName="rootComposite" presStyleCnt="0"/>
-      <dgm:spPr/>
-    </dgm:pt>
-    <dgm:pt modelId="{5D5D0315-B97E-594E-83F0-ED303EF2DD8B}" type="pres">
-      <dgm:prSet presAssocID="{D85D4967-9970-2A45-894D-8D84143E9357}" presName="rootText" presStyleLbl="node4" presStyleIdx="0" presStyleCnt="2">
+    <dgm:pt modelId="{E0BC3A88-5FE9-A34B-B44E-D9687A1D7B45}" type="pres">
+      <dgm:prSet presAssocID="{E99DAD9F-9BF8-D241-8920-345630EDB1F1}" presName="rootComposite" presStyleCnt="0"/>
+      <dgm:spPr/>
+    </dgm:pt>
+    <dgm:pt modelId="{D6BD30AB-FC6C-184C-A8D7-70BFD5498C08}" type="pres">
+      <dgm:prSet presAssocID="{E99DAD9F-9BF8-D241-8920-345630EDB1F1}" presName="rootText" presStyleLbl="node3" presStyleIdx="0" presStyleCnt="2">
         <dgm:presLayoutVars>
           <dgm:chPref val="3"/>
         </dgm:presLayoutVars>
@@ -7812,8 +7780,8 @@
         </a:p>
       </dgm:t>
     </dgm:pt>
-    <dgm:pt modelId="{13E4D40F-E054-3347-AF98-C399E1E43A46}" type="pres">
-      <dgm:prSet presAssocID="{D85D4967-9970-2A45-894D-8D84143E9357}" presName="rootConnector" presStyleLbl="node4" presStyleIdx="0" presStyleCnt="2"/>
+    <dgm:pt modelId="{194228D9-180D-564D-87E6-922248B1F9B4}" type="pres">
+      <dgm:prSet presAssocID="{E99DAD9F-9BF8-D241-8920-345630EDB1F1}" presName="rootConnector" presStyleLbl="node3" presStyleIdx="0" presStyleCnt="2"/>
       <dgm:spPr/>
       <dgm:t>
         <a:bodyPr/>
@@ -7823,32 +7791,12 @@
         </a:p>
       </dgm:t>
     </dgm:pt>
-    <dgm:pt modelId="{DBAC8C63-0C38-C54B-BBD6-0D27192A5356}" type="pres">
-      <dgm:prSet presAssocID="{D85D4967-9970-2A45-894D-8D84143E9357}" presName="hierChild4" presStyleCnt="0"/>
-      <dgm:spPr/>
-    </dgm:pt>
-    <dgm:pt modelId="{AF09FA10-8594-494C-A8E3-7CB428F9CC49}" type="pres">
-      <dgm:prSet presAssocID="{26F7452A-DEA0-D44A-A713-128322436138}" presName="Name37" presStyleLbl="parChTrans1D4" presStyleIdx="1" presStyleCnt="2"/>
-      <dgm:spPr/>
-    </dgm:pt>
-    <dgm:pt modelId="{F728698D-1EE6-7B4A-8A96-1A7ADFB861D5}" type="pres">
-      <dgm:prSet presAssocID="{30479D33-BA35-6B45-BD88-A5B6375A35D5}" presName="hierRoot2" presStyleCnt="0">
-        <dgm:presLayoutVars>
-          <dgm:hierBranch val="init"/>
-        </dgm:presLayoutVars>
-      </dgm:prSet>
-      <dgm:spPr/>
-    </dgm:pt>
-    <dgm:pt modelId="{9B3CAACE-75F1-AA4A-9310-3FFE20BE2357}" type="pres">
-      <dgm:prSet presAssocID="{30479D33-BA35-6B45-BD88-A5B6375A35D5}" presName="rootComposite" presStyleCnt="0"/>
-      <dgm:spPr/>
-    </dgm:pt>
-    <dgm:pt modelId="{7E726BD2-5E02-2943-ADFF-B6EF0BA67FAE}" type="pres">
-      <dgm:prSet presAssocID="{30479D33-BA35-6B45-BD88-A5B6375A35D5}" presName="rootText" presStyleLbl="node4" presStyleIdx="1" presStyleCnt="2">
-        <dgm:presLayoutVars>
-          <dgm:chPref val="3"/>
-        </dgm:presLayoutVars>
-      </dgm:prSet>
+    <dgm:pt modelId="{7F33F7F6-1C91-3942-9C20-54ED323D517F}" type="pres">
+      <dgm:prSet presAssocID="{E99DAD9F-9BF8-D241-8920-345630EDB1F1}" presName="hierChild4" presStyleCnt="0"/>
+      <dgm:spPr/>
+    </dgm:pt>
+    <dgm:pt modelId="{57DA398E-547C-4A44-8724-213247DC0F7D}" type="pres">
+      <dgm:prSet presAssocID="{3555AAF5-7204-E743-BD4A-2C190B923AAB}" presName="Name37" presStyleLbl="parChTrans1D4" presStyleIdx="0" presStyleCnt="2"/>
       <dgm:spPr/>
       <dgm:t>
         <a:bodyPr/>
@@ -7858,8 +7806,24 @@
         </a:p>
       </dgm:t>
     </dgm:pt>
-    <dgm:pt modelId="{3047F863-45AB-4D45-979B-A779492AC4B8}" type="pres">
-      <dgm:prSet presAssocID="{30479D33-BA35-6B45-BD88-A5B6375A35D5}" presName="rootConnector" presStyleLbl="node4" presStyleIdx="1" presStyleCnt="2"/>
+    <dgm:pt modelId="{BE66BCB4-12B0-1F4A-82F9-040143877865}" type="pres">
+      <dgm:prSet presAssocID="{D85D4967-9970-2A45-894D-8D84143E9357}" presName="hierRoot2" presStyleCnt="0">
+        <dgm:presLayoutVars>
+          <dgm:hierBranch val="init"/>
+        </dgm:presLayoutVars>
+      </dgm:prSet>
+      <dgm:spPr/>
+    </dgm:pt>
+    <dgm:pt modelId="{CA88E305-1CCB-3D4F-90E6-BA0A084B7F8F}" type="pres">
+      <dgm:prSet presAssocID="{D85D4967-9970-2A45-894D-8D84143E9357}" presName="rootComposite" presStyleCnt="0"/>
+      <dgm:spPr/>
+    </dgm:pt>
+    <dgm:pt modelId="{5D5D0315-B97E-594E-83F0-ED303EF2DD8B}" type="pres">
+      <dgm:prSet presAssocID="{D85D4967-9970-2A45-894D-8D84143E9357}" presName="rootText" presStyleLbl="node4" presStyleIdx="0" presStyleCnt="2">
+        <dgm:presLayoutVars>
+          <dgm:chPref val="3"/>
+        </dgm:presLayoutVars>
+      </dgm:prSet>
       <dgm:spPr/>
       <dgm:t>
         <a:bodyPr/>
@@ -7869,48 +7833,8 @@
         </a:p>
       </dgm:t>
     </dgm:pt>
-    <dgm:pt modelId="{3AF5E2E9-B933-9E48-837F-7E45B2CC8967}" type="pres">
-      <dgm:prSet presAssocID="{30479D33-BA35-6B45-BD88-A5B6375A35D5}" presName="hierChild4" presStyleCnt="0"/>
-      <dgm:spPr/>
-    </dgm:pt>
-    <dgm:pt modelId="{2E79CB47-8C30-9A43-90B7-EEF6830AE738}" type="pres">
-      <dgm:prSet presAssocID="{30479D33-BA35-6B45-BD88-A5B6375A35D5}" presName="hierChild5" presStyleCnt="0"/>
-      <dgm:spPr/>
-    </dgm:pt>
-    <dgm:pt modelId="{38A40A77-0603-154C-BAB4-268563AB653F}" type="pres">
-      <dgm:prSet presAssocID="{D85D4967-9970-2A45-894D-8D84143E9357}" presName="hierChild5" presStyleCnt="0"/>
-      <dgm:spPr/>
-    </dgm:pt>
-    <dgm:pt modelId="{E990069B-4B56-7E4E-9351-3D94B3F67A49}" type="pres">
-      <dgm:prSet presAssocID="{E99DAD9F-9BF8-D241-8920-345630EDB1F1}" presName="hierChild5" presStyleCnt="0"/>
-      <dgm:spPr/>
-    </dgm:pt>
-    <dgm:pt modelId="{8A53AA22-E768-7644-8C2B-12A25AF5A1F3}" type="pres">
-      <dgm:prSet presAssocID="{A7DBECA3-F8EB-FB43-A7B7-7C5690B85239}" presName="hierChild5" presStyleCnt="0"/>
-      <dgm:spPr/>
-    </dgm:pt>
-    <dgm:pt modelId="{E9A2B22E-777C-224A-BDEC-145A614E7CD4}" type="pres">
-      <dgm:prSet presAssocID="{D5053301-59EB-A84D-9961-88626E9CE22D}" presName="Name37" presStyleLbl="parChTrans1D2" presStyleIdx="1" presStyleCnt="3"/>
-      <dgm:spPr/>
-    </dgm:pt>
-    <dgm:pt modelId="{E5C90585-D74F-A042-A778-7EB41BDB03B4}" type="pres">
-      <dgm:prSet presAssocID="{D1782B6A-D977-EB4F-A060-8FDC30CCA402}" presName="hierRoot2" presStyleCnt="0">
-        <dgm:presLayoutVars>
-          <dgm:hierBranch val="init"/>
-        </dgm:presLayoutVars>
-      </dgm:prSet>
-      <dgm:spPr/>
-    </dgm:pt>
-    <dgm:pt modelId="{E11066E0-7D94-7C4C-9587-4B5580486895}" type="pres">
-      <dgm:prSet presAssocID="{D1782B6A-D977-EB4F-A060-8FDC30CCA402}" presName="rootComposite" presStyleCnt="0"/>
-      <dgm:spPr/>
-    </dgm:pt>
-    <dgm:pt modelId="{F841CCEE-910E-9E46-99EB-3212999763F4}" type="pres">
-      <dgm:prSet presAssocID="{D1782B6A-D977-EB4F-A060-8FDC30CCA402}" presName="rootText" presStyleLbl="node2" presStyleIdx="1" presStyleCnt="3">
-        <dgm:presLayoutVars>
-          <dgm:chPref val="3"/>
-        </dgm:presLayoutVars>
-      </dgm:prSet>
+    <dgm:pt modelId="{13E4D40F-E054-3347-AF98-C399E1E43A46}" type="pres">
+      <dgm:prSet presAssocID="{D85D4967-9970-2A45-894D-8D84143E9357}" presName="rootConnector" presStyleLbl="node4" presStyleIdx="0" presStyleCnt="2"/>
       <dgm:spPr/>
       <dgm:t>
         <a:bodyPr/>
@@ -7920,8 +7844,12 @@
         </a:p>
       </dgm:t>
     </dgm:pt>
-    <dgm:pt modelId="{06B8B3DD-CB01-744E-9403-8D1122390958}" type="pres">
-      <dgm:prSet presAssocID="{D1782B6A-D977-EB4F-A060-8FDC30CCA402}" presName="rootConnector" presStyleLbl="node2" presStyleIdx="1" presStyleCnt="3"/>
+    <dgm:pt modelId="{DBAC8C63-0C38-C54B-BBD6-0D27192A5356}" type="pres">
+      <dgm:prSet presAssocID="{D85D4967-9970-2A45-894D-8D84143E9357}" presName="hierChild4" presStyleCnt="0"/>
+      <dgm:spPr/>
+    </dgm:pt>
+    <dgm:pt modelId="{AF09FA10-8594-494C-A8E3-7CB428F9CC49}" type="pres">
+      <dgm:prSet presAssocID="{26F7452A-DEA0-D44A-A713-128322436138}" presName="Name37" presStyleLbl="parChTrans1D4" presStyleIdx="1" presStyleCnt="2"/>
       <dgm:spPr/>
       <dgm:t>
         <a:bodyPr/>
@@ -7931,32 +7859,20 @@
         </a:p>
       </dgm:t>
     </dgm:pt>
-    <dgm:pt modelId="{FC063706-AFD4-684A-99A6-81535ABD4D95}" type="pres">
-      <dgm:prSet presAssocID="{D1782B6A-D977-EB4F-A060-8FDC30CCA402}" presName="hierChild4" presStyleCnt="0"/>
-      <dgm:spPr/>
-    </dgm:pt>
-    <dgm:pt modelId="{E2448CE6-7084-CF45-986D-8F5AE244C567}" type="pres">
-      <dgm:prSet presAssocID="{D1782B6A-D977-EB4F-A060-8FDC30CCA402}" presName="hierChild5" presStyleCnt="0"/>
-      <dgm:spPr/>
-    </dgm:pt>
-    <dgm:pt modelId="{859807E0-1E00-4647-BA43-40F9434F3A50}" type="pres">
-      <dgm:prSet presAssocID="{2DB4AAAB-DA1A-2347-9E11-5F383FB1091F}" presName="Name37" presStyleLbl="parChTrans1D2" presStyleIdx="2" presStyleCnt="3"/>
-      <dgm:spPr/>
-    </dgm:pt>
-    <dgm:pt modelId="{7C63D9D1-703B-2746-AE08-3E8C466378BD}" type="pres">
-      <dgm:prSet presAssocID="{3D184175-8587-2341-9FA5-3A10244D5DAE}" presName="hierRoot2" presStyleCnt="0">
+    <dgm:pt modelId="{F728698D-1EE6-7B4A-8A96-1A7ADFB861D5}" type="pres">
+      <dgm:prSet presAssocID="{30479D33-BA35-6B45-BD88-A5B6375A35D5}" presName="hierRoot2" presStyleCnt="0">
         <dgm:presLayoutVars>
           <dgm:hierBranch val="init"/>
         </dgm:presLayoutVars>
       </dgm:prSet>
       <dgm:spPr/>
     </dgm:pt>
-    <dgm:pt modelId="{42496125-2E28-A941-BDC7-C31E2BBD6D0A}" type="pres">
-      <dgm:prSet presAssocID="{3D184175-8587-2341-9FA5-3A10244D5DAE}" presName="rootComposite" presStyleCnt="0"/>
-      <dgm:spPr/>
-    </dgm:pt>
-    <dgm:pt modelId="{A75F40FD-F9CE-A84C-AEBC-CADB60A314A0}" type="pres">
-      <dgm:prSet presAssocID="{3D184175-8587-2341-9FA5-3A10244D5DAE}" presName="rootText" presStyleLbl="node2" presStyleIdx="2" presStyleCnt="3">
+    <dgm:pt modelId="{9B3CAACE-75F1-AA4A-9310-3FFE20BE2357}" type="pres">
+      <dgm:prSet presAssocID="{30479D33-BA35-6B45-BD88-A5B6375A35D5}" presName="rootComposite" presStyleCnt="0"/>
+      <dgm:spPr/>
+    </dgm:pt>
+    <dgm:pt modelId="{7E726BD2-5E02-2943-ADFF-B6EF0BA67FAE}" type="pres">
+      <dgm:prSet presAssocID="{30479D33-BA35-6B45-BD88-A5B6375A35D5}" presName="rootText" presStyleLbl="node4" presStyleIdx="1" presStyleCnt="2">
         <dgm:presLayoutVars>
           <dgm:chPref val="3"/>
         </dgm:presLayoutVars>
@@ -7970,8 +7886,8 @@
         </a:p>
       </dgm:t>
     </dgm:pt>
-    <dgm:pt modelId="{EC6C0FB6-8496-7C4F-93C9-BB1D0D47F531}" type="pres">
-      <dgm:prSet presAssocID="{3D184175-8587-2341-9FA5-3A10244D5DAE}" presName="rootConnector" presStyleLbl="node2" presStyleIdx="2" presStyleCnt="3"/>
+    <dgm:pt modelId="{3047F863-45AB-4D45-979B-A779492AC4B8}" type="pres">
+      <dgm:prSet presAssocID="{30479D33-BA35-6B45-BD88-A5B6375A35D5}" presName="rootConnector" presStyleLbl="node4" presStyleIdx="1" presStyleCnt="2"/>
       <dgm:spPr/>
       <dgm:t>
         <a:bodyPr/>
@@ -7981,32 +7897,28 @@
         </a:p>
       </dgm:t>
     </dgm:pt>
-    <dgm:pt modelId="{2FE1C341-31B3-8D4C-B2BD-924D68EFBC77}" type="pres">
-      <dgm:prSet presAssocID="{3D184175-8587-2341-9FA5-3A10244D5DAE}" presName="hierChild4" presStyleCnt="0"/>
-      <dgm:spPr/>
-    </dgm:pt>
-    <dgm:pt modelId="{4280BDEA-1578-884A-8956-3EB0E20A7C88}" type="pres">
-      <dgm:prSet presAssocID="{FE3E7F64-0821-EE41-9F34-35CB6E89A9D7}" presName="Name37" presStyleLbl="parChTrans1D3" presStyleIdx="1" presStyleCnt="2"/>
-      <dgm:spPr/>
-    </dgm:pt>
-    <dgm:pt modelId="{379856DD-51D2-2142-9FF8-110EB02EECA2}" type="pres">
-      <dgm:prSet presAssocID="{57B24C86-3BB3-4F42-87D5-A56F07DB0BE9}" presName="hierRoot2" presStyleCnt="0">
-        <dgm:presLayoutVars>
-          <dgm:hierBranch val="init"/>
-        </dgm:presLayoutVars>
-      </dgm:prSet>
-      <dgm:spPr/>
-    </dgm:pt>
-    <dgm:pt modelId="{E4C71121-D649-DD46-AFC7-850FAAE8DD68}" type="pres">
-      <dgm:prSet presAssocID="{57B24C86-3BB3-4F42-87D5-A56F07DB0BE9}" presName="rootComposite" presStyleCnt="0"/>
-      <dgm:spPr/>
-    </dgm:pt>
-    <dgm:pt modelId="{5FB9E115-E05F-A948-87D4-C28735387692}" type="pres">
-      <dgm:prSet presAssocID="{57B24C86-3BB3-4F42-87D5-A56F07DB0BE9}" presName="rootText" presStyleLbl="node3" presStyleIdx="1" presStyleCnt="2">
-        <dgm:presLayoutVars>
-          <dgm:chPref val="3"/>
-        </dgm:presLayoutVars>
-      </dgm:prSet>
+    <dgm:pt modelId="{3AF5E2E9-B933-9E48-837F-7E45B2CC8967}" type="pres">
+      <dgm:prSet presAssocID="{30479D33-BA35-6B45-BD88-A5B6375A35D5}" presName="hierChild4" presStyleCnt="0"/>
+      <dgm:spPr/>
+    </dgm:pt>
+    <dgm:pt modelId="{2E79CB47-8C30-9A43-90B7-EEF6830AE738}" type="pres">
+      <dgm:prSet presAssocID="{30479D33-BA35-6B45-BD88-A5B6375A35D5}" presName="hierChild5" presStyleCnt="0"/>
+      <dgm:spPr/>
+    </dgm:pt>
+    <dgm:pt modelId="{38A40A77-0603-154C-BAB4-268563AB653F}" type="pres">
+      <dgm:prSet presAssocID="{D85D4967-9970-2A45-894D-8D84143E9357}" presName="hierChild5" presStyleCnt="0"/>
+      <dgm:spPr/>
+    </dgm:pt>
+    <dgm:pt modelId="{E990069B-4B56-7E4E-9351-3D94B3F67A49}" type="pres">
+      <dgm:prSet presAssocID="{E99DAD9F-9BF8-D241-8920-345630EDB1F1}" presName="hierChild5" presStyleCnt="0"/>
+      <dgm:spPr/>
+    </dgm:pt>
+    <dgm:pt modelId="{8A53AA22-E768-7644-8C2B-12A25AF5A1F3}" type="pres">
+      <dgm:prSet presAssocID="{A7DBECA3-F8EB-FB43-A7B7-7C5690B85239}" presName="hierChild5" presStyleCnt="0"/>
+      <dgm:spPr/>
+    </dgm:pt>
+    <dgm:pt modelId="{E9A2B22E-777C-224A-BDEC-145A614E7CD4}" type="pres">
+      <dgm:prSet presAssocID="{D5053301-59EB-A84D-9961-88626E9CE22D}" presName="Name37" presStyleLbl="parChTrans1D2" presStyleIdx="1" presStyleCnt="3"/>
       <dgm:spPr/>
       <dgm:t>
         <a:bodyPr/>
@@ -8016,8 +7928,24 @@
         </a:p>
       </dgm:t>
     </dgm:pt>
-    <dgm:pt modelId="{AD06592D-1E0B-2749-801C-88FC82F4746C}" type="pres">
-      <dgm:prSet presAssocID="{57B24C86-3BB3-4F42-87D5-A56F07DB0BE9}" presName="rootConnector" presStyleLbl="node3" presStyleIdx="1" presStyleCnt="2"/>
+    <dgm:pt modelId="{E5C90585-D74F-A042-A778-7EB41BDB03B4}" type="pres">
+      <dgm:prSet presAssocID="{D1782B6A-D977-EB4F-A060-8FDC30CCA402}" presName="hierRoot2" presStyleCnt="0">
+        <dgm:presLayoutVars>
+          <dgm:hierBranch val="init"/>
+        </dgm:presLayoutVars>
+      </dgm:prSet>
+      <dgm:spPr/>
+    </dgm:pt>
+    <dgm:pt modelId="{E11066E0-7D94-7C4C-9587-4B5580486895}" type="pres">
+      <dgm:prSet presAssocID="{D1782B6A-D977-EB4F-A060-8FDC30CCA402}" presName="rootComposite" presStyleCnt="0"/>
+      <dgm:spPr/>
+    </dgm:pt>
+    <dgm:pt modelId="{F841CCEE-910E-9E46-99EB-3212999763F4}" type="pres">
+      <dgm:prSet presAssocID="{D1782B6A-D977-EB4F-A060-8FDC30CCA402}" presName="rootText" presStyleLbl="node2" presStyleIdx="1" presStyleCnt="3">
+        <dgm:presLayoutVars>
+          <dgm:chPref val="3"/>
+        </dgm:presLayoutVars>
+      </dgm:prSet>
       <dgm:spPr/>
       <dgm:t>
         <a:bodyPr/>
@@ -8027,6 +7955,127 @@
         </a:p>
       </dgm:t>
     </dgm:pt>
+    <dgm:pt modelId="{06B8B3DD-CB01-744E-9403-8D1122390958}" type="pres">
+      <dgm:prSet presAssocID="{D1782B6A-D977-EB4F-A060-8FDC30CCA402}" presName="rootConnector" presStyleLbl="node2" presStyleIdx="1" presStyleCnt="3"/>
+      <dgm:spPr/>
+      <dgm:t>
+        <a:bodyPr/>
+        <a:lstStyle/>
+        <a:p>
+          <a:endParaRPr lang="en-US"/>
+        </a:p>
+      </dgm:t>
+    </dgm:pt>
+    <dgm:pt modelId="{FC063706-AFD4-684A-99A6-81535ABD4D95}" type="pres">
+      <dgm:prSet presAssocID="{D1782B6A-D977-EB4F-A060-8FDC30CCA402}" presName="hierChild4" presStyleCnt="0"/>
+      <dgm:spPr/>
+    </dgm:pt>
+    <dgm:pt modelId="{E2448CE6-7084-CF45-986D-8F5AE244C567}" type="pres">
+      <dgm:prSet presAssocID="{D1782B6A-D977-EB4F-A060-8FDC30CCA402}" presName="hierChild5" presStyleCnt="0"/>
+      <dgm:spPr/>
+    </dgm:pt>
+    <dgm:pt modelId="{859807E0-1E00-4647-BA43-40F9434F3A50}" type="pres">
+      <dgm:prSet presAssocID="{2DB4AAAB-DA1A-2347-9E11-5F383FB1091F}" presName="Name37" presStyleLbl="parChTrans1D2" presStyleIdx="2" presStyleCnt="3"/>
+      <dgm:spPr/>
+      <dgm:t>
+        <a:bodyPr/>
+        <a:lstStyle/>
+        <a:p>
+          <a:endParaRPr lang="en-US"/>
+        </a:p>
+      </dgm:t>
+    </dgm:pt>
+    <dgm:pt modelId="{7C63D9D1-703B-2746-AE08-3E8C466378BD}" type="pres">
+      <dgm:prSet presAssocID="{3D184175-8587-2341-9FA5-3A10244D5DAE}" presName="hierRoot2" presStyleCnt="0">
+        <dgm:presLayoutVars>
+          <dgm:hierBranch val="init"/>
+        </dgm:presLayoutVars>
+      </dgm:prSet>
+      <dgm:spPr/>
+    </dgm:pt>
+    <dgm:pt modelId="{42496125-2E28-A941-BDC7-C31E2BBD6D0A}" type="pres">
+      <dgm:prSet presAssocID="{3D184175-8587-2341-9FA5-3A10244D5DAE}" presName="rootComposite" presStyleCnt="0"/>
+      <dgm:spPr/>
+    </dgm:pt>
+    <dgm:pt modelId="{A75F40FD-F9CE-A84C-AEBC-CADB60A314A0}" type="pres">
+      <dgm:prSet presAssocID="{3D184175-8587-2341-9FA5-3A10244D5DAE}" presName="rootText" presStyleLbl="node2" presStyleIdx="2" presStyleCnt="3">
+        <dgm:presLayoutVars>
+          <dgm:chPref val="3"/>
+        </dgm:presLayoutVars>
+      </dgm:prSet>
+      <dgm:spPr/>
+      <dgm:t>
+        <a:bodyPr/>
+        <a:lstStyle/>
+        <a:p>
+          <a:endParaRPr lang="en-US"/>
+        </a:p>
+      </dgm:t>
+    </dgm:pt>
+    <dgm:pt modelId="{EC6C0FB6-8496-7C4F-93C9-BB1D0D47F531}" type="pres">
+      <dgm:prSet presAssocID="{3D184175-8587-2341-9FA5-3A10244D5DAE}" presName="rootConnector" presStyleLbl="node2" presStyleIdx="2" presStyleCnt="3"/>
+      <dgm:spPr/>
+      <dgm:t>
+        <a:bodyPr/>
+        <a:lstStyle/>
+        <a:p>
+          <a:endParaRPr lang="en-US"/>
+        </a:p>
+      </dgm:t>
+    </dgm:pt>
+    <dgm:pt modelId="{2FE1C341-31B3-8D4C-B2BD-924D68EFBC77}" type="pres">
+      <dgm:prSet presAssocID="{3D184175-8587-2341-9FA5-3A10244D5DAE}" presName="hierChild4" presStyleCnt="0"/>
+      <dgm:spPr/>
+    </dgm:pt>
+    <dgm:pt modelId="{4280BDEA-1578-884A-8956-3EB0E20A7C88}" type="pres">
+      <dgm:prSet presAssocID="{FE3E7F64-0821-EE41-9F34-35CB6E89A9D7}" presName="Name37" presStyleLbl="parChTrans1D3" presStyleIdx="1" presStyleCnt="2"/>
+      <dgm:spPr/>
+      <dgm:t>
+        <a:bodyPr/>
+        <a:lstStyle/>
+        <a:p>
+          <a:endParaRPr lang="en-US"/>
+        </a:p>
+      </dgm:t>
+    </dgm:pt>
+    <dgm:pt modelId="{379856DD-51D2-2142-9FF8-110EB02EECA2}" type="pres">
+      <dgm:prSet presAssocID="{57B24C86-3BB3-4F42-87D5-A56F07DB0BE9}" presName="hierRoot2" presStyleCnt="0">
+        <dgm:presLayoutVars>
+          <dgm:hierBranch val="init"/>
+        </dgm:presLayoutVars>
+      </dgm:prSet>
+      <dgm:spPr/>
+    </dgm:pt>
+    <dgm:pt modelId="{E4C71121-D649-DD46-AFC7-850FAAE8DD68}" type="pres">
+      <dgm:prSet presAssocID="{57B24C86-3BB3-4F42-87D5-A56F07DB0BE9}" presName="rootComposite" presStyleCnt="0"/>
+      <dgm:spPr/>
+    </dgm:pt>
+    <dgm:pt modelId="{5FB9E115-E05F-A948-87D4-C28735387692}" type="pres">
+      <dgm:prSet presAssocID="{57B24C86-3BB3-4F42-87D5-A56F07DB0BE9}" presName="rootText" presStyleLbl="node3" presStyleIdx="1" presStyleCnt="2">
+        <dgm:presLayoutVars>
+          <dgm:chPref val="3"/>
+        </dgm:presLayoutVars>
+      </dgm:prSet>
+      <dgm:spPr/>
+      <dgm:t>
+        <a:bodyPr/>
+        <a:lstStyle/>
+        <a:p>
+          <a:endParaRPr lang="en-US"/>
+        </a:p>
+      </dgm:t>
+    </dgm:pt>
+    <dgm:pt modelId="{AD06592D-1E0B-2749-801C-88FC82F4746C}" type="pres">
+      <dgm:prSet presAssocID="{57B24C86-3BB3-4F42-87D5-A56F07DB0BE9}" presName="rootConnector" presStyleLbl="node3" presStyleIdx="1" presStyleCnt="2"/>
+      <dgm:spPr/>
+      <dgm:t>
+        <a:bodyPr/>
+        <a:lstStyle/>
+        <a:p>
+          <a:endParaRPr lang="en-US"/>
+        </a:p>
+      </dgm:t>
+    </dgm:pt>
     <dgm:pt modelId="{0CFB5526-9015-7949-83B1-B7456B1F780F}" type="pres">
       <dgm:prSet presAssocID="{57B24C86-3BB3-4F42-87D5-A56F07DB0BE9}" presName="hierChild4" presStyleCnt="0"/>
       <dgm:spPr/>
@@ -8045,38 +8094,38 @@
     </dgm:pt>
   </dgm:ptLst>
   <dgm:cxnLst>
+    <dgm:cxn modelId="{AE5EEDBB-9486-FE4B-84A3-3C5E5850F685}" type="presOf" srcId="{57B24C86-3BB3-4F42-87D5-A56F07DB0BE9}" destId="{AD06592D-1E0B-2749-801C-88FC82F4746C}" srcOrd="1" destOrd="0" presId="urn:microsoft.com/office/officeart/2005/8/layout/orgChart1"/>
+    <dgm:cxn modelId="{9F4EF53B-0D2C-3F4E-92D8-7999A8F6B666}" srcId="{B6D66976-BA65-D544-9781-70717DC331B0}" destId="{3D184175-8587-2341-9FA5-3A10244D5DAE}" srcOrd="2" destOrd="0" parTransId="{2DB4AAAB-DA1A-2347-9E11-5F383FB1091F}" sibTransId="{A1E0F1C8-DCC9-CF4B-8BE9-C5B57C4959C9}"/>
+    <dgm:cxn modelId="{871FDB35-125F-6746-A688-B6C338354467}" type="presOf" srcId="{DA1F5B71-0C82-BC40-9676-093E6CEDE508}" destId="{C1F458B3-EDBB-D94A-A8A4-629CCD2AFC78}" srcOrd="0" destOrd="0" presId="urn:microsoft.com/office/officeart/2005/8/layout/orgChart1"/>
+    <dgm:cxn modelId="{EE41B323-6C99-D047-9324-3758E8718F3B}" type="presOf" srcId="{A7DBECA3-F8EB-FB43-A7B7-7C5690B85239}" destId="{5CE8B228-FCE6-EB4F-8E39-9849546C0FAA}" srcOrd="1" destOrd="0" presId="urn:microsoft.com/office/officeart/2005/8/layout/orgChart1"/>
+    <dgm:cxn modelId="{4CF3CD19-688C-A644-BC2A-96B53175D8E9}" srcId="{B6D66976-BA65-D544-9781-70717DC331B0}" destId="{A7DBECA3-F8EB-FB43-A7B7-7C5690B85239}" srcOrd="0" destOrd="0" parTransId="{384EC59C-28A8-FD4A-BE76-AC3C762AA11A}" sibTransId="{05BC24B8-45A6-814A-AAF0-8AD255B6BC3D}"/>
+    <dgm:cxn modelId="{BC969955-F10B-6742-8524-DFCCFE6DE123}" type="presOf" srcId="{3D184175-8587-2341-9FA5-3A10244D5DAE}" destId="{A75F40FD-F9CE-A84C-AEBC-CADB60A314A0}" srcOrd="0" destOrd="0" presId="urn:microsoft.com/office/officeart/2005/8/layout/orgChart1"/>
+    <dgm:cxn modelId="{BBBB9E8B-467B-D748-A3C5-6BB896426547}" type="presOf" srcId="{57B24C86-3BB3-4F42-87D5-A56F07DB0BE9}" destId="{5FB9E115-E05F-A948-87D4-C28735387692}" srcOrd="0" destOrd="0" presId="urn:microsoft.com/office/officeart/2005/8/layout/orgChart1"/>
+    <dgm:cxn modelId="{FAF4A8BE-EA21-AA4B-89BE-983CD71C1CEC}" srcId="{46CEAA11-2189-4337-A6B5-CBA0319EFCEE}" destId="{B6D66976-BA65-D544-9781-70717DC331B0}" srcOrd="0" destOrd="0" parTransId="{1628D0EA-6A2B-EB49-BBA9-419F710DA0D6}" sibTransId="{FD58A060-F82D-7F45-B028-06014A5AF5AF}"/>
+    <dgm:cxn modelId="{269B64CC-9A95-B84D-8067-E71182861D53}" type="presOf" srcId="{E99DAD9F-9BF8-D241-8920-345630EDB1F1}" destId="{D6BD30AB-FC6C-184C-A8D7-70BFD5498C08}" srcOrd="0" destOrd="0" presId="urn:microsoft.com/office/officeart/2005/8/layout/orgChart1"/>
+    <dgm:cxn modelId="{979882F6-4A22-884A-81C8-69747A9B2AAE}" type="presOf" srcId="{D1782B6A-D977-EB4F-A060-8FDC30CCA402}" destId="{06B8B3DD-CB01-744E-9403-8D1122390958}" srcOrd="1" destOrd="0" presId="urn:microsoft.com/office/officeart/2005/8/layout/orgChart1"/>
+    <dgm:cxn modelId="{56FEA1F6-6EE5-6646-AE71-DEB2D505DE3C}" type="presOf" srcId="{3D184175-8587-2341-9FA5-3A10244D5DAE}" destId="{EC6C0FB6-8496-7C4F-93C9-BB1D0D47F531}" srcOrd="1" destOrd="0" presId="urn:microsoft.com/office/officeart/2005/8/layout/orgChart1"/>
+    <dgm:cxn modelId="{FAE74DD8-FF55-B84C-8070-F52928BCBA88}" type="presOf" srcId="{E99DAD9F-9BF8-D241-8920-345630EDB1F1}" destId="{194228D9-180D-564D-87E6-922248B1F9B4}" srcOrd="1" destOrd="0" presId="urn:microsoft.com/office/officeart/2005/8/layout/orgChart1"/>
+    <dgm:cxn modelId="{5B108B41-9773-6548-ABE7-415C4D999A01}" type="presOf" srcId="{3555AAF5-7204-E743-BD4A-2C190B923AAB}" destId="{57DA398E-547C-4A44-8724-213247DC0F7D}" srcOrd="0" destOrd="0" presId="urn:microsoft.com/office/officeart/2005/8/layout/orgChart1"/>
+    <dgm:cxn modelId="{6F117A48-4FF7-9842-B606-2817F379D137}" srcId="{3D184175-8587-2341-9FA5-3A10244D5DAE}" destId="{57B24C86-3BB3-4F42-87D5-A56F07DB0BE9}" srcOrd="0" destOrd="0" parTransId="{FE3E7F64-0821-EE41-9F34-35CB6E89A9D7}" sibTransId="{D2C0E0BF-5049-B141-B1B5-AACFCDFA772E}"/>
+    <dgm:cxn modelId="{EFD0D107-295D-9D4B-9FA5-F50C050092C6}" type="presOf" srcId="{D85D4967-9970-2A45-894D-8D84143E9357}" destId="{5D5D0315-B97E-594E-83F0-ED303EF2DD8B}" srcOrd="0" destOrd="0" presId="urn:microsoft.com/office/officeart/2005/8/layout/orgChart1"/>
+    <dgm:cxn modelId="{63428B78-4D35-F140-A9D2-79AB56E8F641}" srcId="{D85D4967-9970-2A45-894D-8D84143E9357}" destId="{30479D33-BA35-6B45-BD88-A5B6375A35D5}" srcOrd="0" destOrd="0" parTransId="{26F7452A-DEA0-D44A-A713-128322436138}" sibTransId="{A152D5C5-56B8-404B-ACEB-AA575A0B15DF}"/>
+    <dgm:cxn modelId="{3A9A8613-3425-7449-AA74-12E9811FEE01}" type="presOf" srcId="{26F7452A-DEA0-D44A-A713-128322436138}" destId="{AF09FA10-8594-494C-A8E3-7CB428F9CC49}" srcOrd="0" destOrd="0" presId="urn:microsoft.com/office/officeart/2005/8/layout/orgChart1"/>
+    <dgm:cxn modelId="{19B8AFE5-9AE5-EF46-BB51-72FC0D342F7A}" type="presOf" srcId="{D1782B6A-D977-EB4F-A060-8FDC30CCA402}" destId="{F841CCEE-910E-9E46-99EB-3212999763F4}" srcOrd="0" destOrd="0" presId="urn:microsoft.com/office/officeart/2005/8/layout/orgChart1"/>
+    <dgm:cxn modelId="{26EA2ABF-9E68-034E-97E4-3F169A2B0A74}" type="presOf" srcId="{D85D4967-9970-2A45-894D-8D84143E9357}" destId="{13E4D40F-E054-3347-AF98-C399E1E43A46}" srcOrd="1" destOrd="0" presId="urn:microsoft.com/office/officeart/2005/8/layout/orgChart1"/>
+    <dgm:cxn modelId="{3F122170-A371-F94A-A828-1A0CE8E00DC6}" type="presOf" srcId="{B6D66976-BA65-D544-9781-70717DC331B0}" destId="{D5C03621-5B2E-3742-BC39-6F7155F14D2A}" srcOrd="1" destOrd="0" presId="urn:microsoft.com/office/officeart/2005/8/layout/orgChart1"/>
+    <dgm:cxn modelId="{AA92A35A-1106-C74B-8883-763A616FF18B}" srcId="{A7DBECA3-F8EB-FB43-A7B7-7C5690B85239}" destId="{E99DAD9F-9BF8-D241-8920-345630EDB1F1}" srcOrd="0" destOrd="0" parTransId="{DA1F5B71-0C82-BC40-9676-093E6CEDE508}" sibTransId="{7B2AB9BA-6058-4449-B962-B9639639077C}"/>
+    <dgm:cxn modelId="{C978C7B0-5753-1B43-A2FA-403627B70302}" type="presOf" srcId="{B6D66976-BA65-D544-9781-70717DC331B0}" destId="{B09CC45F-12AF-6B40-B59F-EE185159397C}" srcOrd="0" destOrd="0" presId="urn:microsoft.com/office/officeart/2005/8/layout/orgChart1"/>
+    <dgm:cxn modelId="{0F8E6209-BEB5-F141-81D5-B1C42DECD305}" type="presOf" srcId="{2DB4AAAB-DA1A-2347-9E11-5F383FB1091F}" destId="{859807E0-1E00-4647-BA43-40F9434F3A50}" srcOrd="0" destOrd="0" presId="urn:microsoft.com/office/officeart/2005/8/layout/orgChart1"/>
+    <dgm:cxn modelId="{8C000D07-86EB-C54B-8848-BF634A611247}" srcId="{B6D66976-BA65-D544-9781-70717DC331B0}" destId="{D1782B6A-D977-EB4F-A060-8FDC30CCA402}" srcOrd="1" destOrd="0" parTransId="{D5053301-59EB-A84D-9961-88626E9CE22D}" sibTransId="{0FE8E370-D2DE-8644-8AC2-7C860A4B7A5B}"/>
+    <dgm:cxn modelId="{AE45718C-30AF-1243-A9DE-0B1F349473B7}" type="presOf" srcId="{384EC59C-28A8-FD4A-BE76-AC3C762AA11A}" destId="{1AC5FD1E-3656-1049-AF26-BE3335955D52}" srcOrd="0" destOrd="0" presId="urn:microsoft.com/office/officeart/2005/8/layout/orgChart1"/>
+    <dgm:cxn modelId="{06774B76-D449-A94D-883F-A0B13177601D}" type="presOf" srcId="{30479D33-BA35-6B45-BD88-A5B6375A35D5}" destId="{3047F863-45AB-4D45-979B-A779492AC4B8}" srcOrd="1" destOrd="0" presId="urn:microsoft.com/office/officeart/2005/8/layout/orgChart1"/>
+    <dgm:cxn modelId="{C693988E-CDF8-9F44-9073-FA48591DA4C8}" type="presOf" srcId="{FE3E7F64-0821-EE41-9F34-35CB6E89A9D7}" destId="{4280BDEA-1578-884A-8956-3EB0E20A7C88}" srcOrd="0" destOrd="0" presId="urn:microsoft.com/office/officeart/2005/8/layout/orgChart1"/>
+    <dgm:cxn modelId="{3791076D-8C23-064D-AD81-60CB39C3D6B3}" type="presOf" srcId="{30479D33-BA35-6B45-BD88-A5B6375A35D5}" destId="{7E726BD2-5E02-2943-ADFF-B6EF0BA67FAE}" srcOrd="0" destOrd="0" presId="urn:microsoft.com/office/officeart/2005/8/layout/orgChart1"/>
+    <dgm:cxn modelId="{2B458D8A-69A7-594C-9A13-64503B1B224C}" type="presOf" srcId="{D5053301-59EB-A84D-9961-88626E9CE22D}" destId="{E9A2B22E-777C-224A-BDEC-145A614E7CD4}" srcOrd="0" destOrd="0" presId="urn:microsoft.com/office/officeart/2005/8/layout/orgChart1"/>
     <dgm:cxn modelId="{B1A163D4-9A00-984A-BAF3-3A2E4D609389}" type="presOf" srcId="{46CEAA11-2189-4337-A6B5-CBA0319EFCEE}" destId="{E5DC0FFD-9516-436D-9BC7-7D3F3A652D9C}" srcOrd="0" destOrd="0" presId="urn:microsoft.com/office/officeart/2005/8/layout/orgChart1"/>
-    <dgm:cxn modelId="{0F8E6209-BEB5-F141-81D5-B1C42DECD305}" type="presOf" srcId="{2DB4AAAB-DA1A-2347-9E11-5F383FB1091F}" destId="{859807E0-1E00-4647-BA43-40F9434F3A50}" srcOrd="0" destOrd="0" presId="urn:microsoft.com/office/officeart/2005/8/layout/orgChart1"/>
-    <dgm:cxn modelId="{979882F6-4A22-884A-81C8-69747A9B2AAE}" type="presOf" srcId="{D1782B6A-D977-EB4F-A060-8FDC30CCA402}" destId="{06B8B3DD-CB01-744E-9403-8D1122390958}" srcOrd="1" destOrd="0" presId="urn:microsoft.com/office/officeart/2005/8/layout/orgChart1"/>
-    <dgm:cxn modelId="{06774B76-D449-A94D-883F-A0B13177601D}" type="presOf" srcId="{30479D33-BA35-6B45-BD88-A5B6375A35D5}" destId="{3047F863-45AB-4D45-979B-A779492AC4B8}" srcOrd="1" destOrd="0" presId="urn:microsoft.com/office/officeart/2005/8/layout/orgChart1"/>
-    <dgm:cxn modelId="{AE45718C-30AF-1243-A9DE-0B1F349473B7}" type="presOf" srcId="{384EC59C-28A8-FD4A-BE76-AC3C762AA11A}" destId="{1AC5FD1E-3656-1049-AF26-BE3335955D52}" srcOrd="0" destOrd="0" presId="urn:microsoft.com/office/officeart/2005/8/layout/orgChart1"/>
-    <dgm:cxn modelId="{BC969955-F10B-6742-8524-DFCCFE6DE123}" type="presOf" srcId="{3D184175-8587-2341-9FA5-3A10244D5DAE}" destId="{A75F40FD-F9CE-A84C-AEBC-CADB60A314A0}" srcOrd="0" destOrd="0" presId="urn:microsoft.com/office/officeart/2005/8/layout/orgChart1"/>
-    <dgm:cxn modelId="{56FEA1F6-6EE5-6646-AE71-DEB2D505DE3C}" type="presOf" srcId="{3D184175-8587-2341-9FA5-3A10244D5DAE}" destId="{EC6C0FB6-8496-7C4F-93C9-BB1D0D47F531}" srcOrd="1" destOrd="0" presId="urn:microsoft.com/office/officeart/2005/8/layout/orgChart1"/>
-    <dgm:cxn modelId="{AA92A35A-1106-C74B-8883-763A616FF18B}" srcId="{A7DBECA3-F8EB-FB43-A7B7-7C5690B85239}" destId="{E99DAD9F-9BF8-D241-8920-345630EDB1F1}" srcOrd="0" destOrd="0" parTransId="{DA1F5B71-0C82-BC40-9676-093E6CEDE508}" sibTransId="{7B2AB9BA-6058-4449-B962-B9639639077C}"/>
-    <dgm:cxn modelId="{6F117A48-4FF7-9842-B606-2817F379D137}" srcId="{3D184175-8587-2341-9FA5-3A10244D5DAE}" destId="{57B24C86-3BB3-4F42-87D5-A56F07DB0BE9}" srcOrd="0" destOrd="0" parTransId="{FE3E7F64-0821-EE41-9F34-35CB6E89A9D7}" sibTransId="{D2C0E0BF-5049-B141-B1B5-AACFCDFA772E}"/>
-    <dgm:cxn modelId="{269B64CC-9A95-B84D-8067-E71182861D53}" type="presOf" srcId="{E99DAD9F-9BF8-D241-8920-345630EDB1F1}" destId="{D6BD30AB-FC6C-184C-A8D7-70BFD5498C08}" srcOrd="0" destOrd="0" presId="urn:microsoft.com/office/officeart/2005/8/layout/orgChart1"/>
-    <dgm:cxn modelId="{5B108B41-9773-6548-ABE7-415C4D999A01}" type="presOf" srcId="{3555AAF5-7204-E743-BD4A-2C190B923AAB}" destId="{57DA398E-547C-4A44-8724-213247DC0F7D}" srcOrd="0" destOrd="0" presId="urn:microsoft.com/office/officeart/2005/8/layout/orgChart1"/>
     <dgm:cxn modelId="{DA4261E0-113D-D54C-BF6E-DFF05A2BDFA1}" type="presOf" srcId="{A7DBECA3-F8EB-FB43-A7B7-7C5690B85239}" destId="{5E76C677-F7E4-DD40-A3BF-53EDF2E9AAC3}" srcOrd="0" destOrd="0" presId="urn:microsoft.com/office/officeart/2005/8/layout/orgChart1"/>
-    <dgm:cxn modelId="{BBBB9E8B-467B-D748-A3C5-6BB896426547}" type="presOf" srcId="{57B24C86-3BB3-4F42-87D5-A56F07DB0BE9}" destId="{5FB9E115-E05F-A948-87D4-C28735387692}" srcOrd="0" destOrd="0" presId="urn:microsoft.com/office/officeart/2005/8/layout/orgChart1"/>
-    <dgm:cxn modelId="{4CF3CD19-688C-A644-BC2A-96B53175D8E9}" srcId="{B6D66976-BA65-D544-9781-70717DC331B0}" destId="{A7DBECA3-F8EB-FB43-A7B7-7C5690B85239}" srcOrd="0" destOrd="0" parTransId="{384EC59C-28A8-FD4A-BE76-AC3C762AA11A}" sibTransId="{05BC24B8-45A6-814A-AAF0-8AD255B6BC3D}"/>
-    <dgm:cxn modelId="{EE41B323-6C99-D047-9324-3758E8718F3B}" type="presOf" srcId="{A7DBECA3-F8EB-FB43-A7B7-7C5690B85239}" destId="{5CE8B228-FCE6-EB4F-8E39-9849546C0FAA}" srcOrd="1" destOrd="0" presId="urn:microsoft.com/office/officeart/2005/8/layout/orgChart1"/>
-    <dgm:cxn modelId="{9F4EF53B-0D2C-3F4E-92D8-7999A8F6B666}" srcId="{B6D66976-BA65-D544-9781-70717DC331B0}" destId="{3D184175-8587-2341-9FA5-3A10244D5DAE}" srcOrd="2" destOrd="0" parTransId="{2DB4AAAB-DA1A-2347-9E11-5F383FB1091F}" sibTransId="{A1E0F1C8-DCC9-CF4B-8BE9-C5B57C4959C9}"/>
-    <dgm:cxn modelId="{AE5EEDBB-9486-FE4B-84A3-3C5E5850F685}" type="presOf" srcId="{57B24C86-3BB3-4F42-87D5-A56F07DB0BE9}" destId="{AD06592D-1E0B-2749-801C-88FC82F4746C}" srcOrd="1" destOrd="0" presId="urn:microsoft.com/office/officeart/2005/8/layout/orgChart1"/>
     <dgm:cxn modelId="{856F18C7-AED3-9341-8D1F-2C47446924AA}" srcId="{E99DAD9F-9BF8-D241-8920-345630EDB1F1}" destId="{D85D4967-9970-2A45-894D-8D84143E9357}" srcOrd="0" destOrd="0" parTransId="{3555AAF5-7204-E743-BD4A-2C190B923AAB}" sibTransId="{DC2EC10F-36F4-4242-BC91-7AE8D68BDF2C}"/>
-    <dgm:cxn modelId="{3791076D-8C23-064D-AD81-60CB39C3D6B3}" type="presOf" srcId="{30479D33-BA35-6B45-BD88-A5B6375A35D5}" destId="{7E726BD2-5E02-2943-ADFF-B6EF0BA67FAE}" srcOrd="0" destOrd="0" presId="urn:microsoft.com/office/officeart/2005/8/layout/orgChart1"/>
-    <dgm:cxn modelId="{EFD0D107-295D-9D4B-9FA5-F50C050092C6}" type="presOf" srcId="{D85D4967-9970-2A45-894D-8D84143E9357}" destId="{5D5D0315-B97E-594E-83F0-ED303EF2DD8B}" srcOrd="0" destOrd="0" presId="urn:microsoft.com/office/officeart/2005/8/layout/orgChart1"/>
-    <dgm:cxn modelId="{8C000D07-86EB-C54B-8848-BF634A611247}" srcId="{B6D66976-BA65-D544-9781-70717DC331B0}" destId="{D1782B6A-D977-EB4F-A060-8FDC30CCA402}" srcOrd="1" destOrd="0" parTransId="{D5053301-59EB-A84D-9961-88626E9CE22D}" sibTransId="{0FE8E370-D2DE-8644-8AC2-7C860A4B7A5B}"/>
-    <dgm:cxn modelId="{C978C7B0-5753-1B43-A2FA-403627B70302}" type="presOf" srcId="{B6D66976-BA65-D544-9781-70717DC331B0}" destId="{B09CC45F-12AF-6B40-B59F-EE185159397C}" srcOrd="0" destOrd="0" presId="urn:microsoft.com/office/officeart/2005/8/layout/orgChart1"/>
-    <dgm:cxn modelId="{19B8AFE5-9AE5-EF46-BB51-72FC0D342F7A}" type="presOf" srcId="{D1782B6A-D977-EB4F-A060-8FDC30CCA402}" destId="{F841CCEE-910E-9E46-99EB-3212999763F4}" srcOrd="0" destOrd="0" presId="urn:microsoft.com/office/officeart/2005/8/layout/orgChart1"/>
-    <dgm:cxn modelId="{63428B78-4D35-F140-A9D2-79AB56E8F641}" srcId="{D85D4967-9970-2A45-894D-8D84143E9357}" destId="{30479D33-BA35-6B45-BD88-A5B6375A35D5}" srcOrd="0" destOrd="0" parTransId="{26F7452A-DEA0-D44A-A713-128322436138}" sibTransId="{A152D5C5-56B8-404B-ACEB-AA575A0B15DF}"/>
-    <dgm:cxn modelId="{3F122170-A371-F94A-A828-1A0CE8E00DC6}" type="presOf" srcId="{B6D66976-BA65-D544-9781-70717DC331B0}" destId="{D5C03621-5B2E-3742-BC39-6F7155F14D2A}" srcOrd="1" destOrd="0" presId="urn:microsoft.com/office/officeart/2005/8/layout/orgChart1"/>
-    <dgm:cxn modelId="{FAE74DD8-FF55-B84C-8070-F52928BCBA88}" type="presOf" srcId="{E99DAD9F-9BF8-D241-8920-345630EDB1F1}" destId="{194228D9-180D-564D-87E6-922248B1F9B4}" srcOrd="1" destOrd="0" presId="urn:microsoft.com/office/officeart/2005/8/layout/orgChart1"/>
-    <dgm:cxn modelId="{26EA2ABF-9E68-034E-97E4-3F169A2B0A74}" type="presOf" srcId="{D85D4967-9970-2A45-894D-8D84143E9357}" destId="{13E4D40F-E054-3347-AF98-C399E1E43A46}" srcOrd="1" destOrd="0" presId="urn:microsoft.com/office/officeart/2005/8/layout/orgChart1"/>
-    <dgm:cxn modelId="{FAF4A8BE-EA21-AA4B-89BE-983CD71C1CEC}" srcId="{46CEAA11-2189-4337-A6B5-CBA0319EFCEE}" destId="{B6D66976-BA65-D544-9781-70717DC331B0}" srcOrd="0" destOrd="0" parTransId="{1628D0EA-6A2B-EB49-BBA9-419F710DA0D6}" sibTransId="{FD58A060-F82D-7F45-B028-06014A5AF5AF}"/>
-    <dgm:cxn modelId="{871FDB35-125F-6746-A688-B6C338354467}" type="presOf" srcId="{DA1F5B71-0C82-BC40-9676-093E6CEDE508}" destId="{C1F458B3-EDBB-D94A-A8A4-629CCD2AFC78}" srcOrd="0" destOrd="0" presId="urn:microsoft.com/office/officeart/2005/8/layout/orgChart1"/>
-    <dgm:cxn modelId="{C693988E-CDF8-9F44-9073-FA48591DA4C8}" type="presOf" srcId="{FE3E7F64-0821-EE41-9F34-35CB6E89A9D7}" destId="{4280BDEA-1578-884A-8956-3EB0E20A7C88}" srcOrd="0" destOrd="0" presId="urn:microsoft.com/office/officeart/2005/8/layout/orgChart1"/>
-    <dgm:cxn modelId="{3A9A8613-3425-7449-AA74-12E9811FEE01}" type="presOf" srcId="{26F7452A-DEA0-D44A-A713-128322436138}" destId="{AF09FA10-8594-494C-A8E3-7CB428F9CC49}" srcOrd="0" destOrd="0" presId="urn:microsoft.com/office/officeart/2005/8/layout/orgChart1"/>
-    <dgm:cxn modelId="{2B458D8A-69A7-594C-9A13-64503B1B224C}" type="presOf" srcId="{D5053301-59EB-A84D-9961-88626E9CE22D}" destId="{E9A2B22E-777C-224A-BDEC-145A614E7CD4}" srcOrd="0" destOrd="0" presId="urn:microsoft.com/office/officeart/2005/8/layout/orgChart1"/>
     <dgm:cxn modelId="{2B09D2E9-1305-AD4B-8B5E-0990985ACF69}" type="presParOf" srcId="{E5DC0FFD-9516-436D-9BC7-7D3F3A652D9C}" destId="{A792A79C-CB86-B74B-BA80-731654FDE078}" srcOrd="0" destOrd="0" presId="urn:microsoft.com/office/officeart/2005/8/layout/orgChart1"/>
     <dgm:cxn modelId="{89823187-CB99-6449-9AE0-93209A905BDB}" type="presParOf" srcId="{A792A79C-CB86-B74B-BA80-731654FDE078}" destId="{C0E55A55-8FF9-884E-942D-96E85D785467}" srcOrd="0" destOrd="0" presId="urn:microsoft.com/office/officeart/2005/8/layout/orgChart1"/>
     <dgm:cxn modelId="{5A431BAC-8E45-1042-9154-6F5C117FC3C7}" type="presParOf" srcId="{C0E55A55-8FF9-884E-942D-96E85D785467}" destId="{B09CC45F-12AF-6B40-B59F-EE185159397C}" srcOrd="0" destOrd="0" presId="urn:microsoft.com/office/officeart/2005/8/layout/orgChart1"/>
@@ -8561,11 +8610,7 @@
         <a:p>
           <a:r>
             <a:rPr lang="en-US" dirty="0" smtClean="0"/>
-            <a:t>SVN, </a:t>
-          </a:r>
-          <a:r>
-            <a:rPr lang="en-US" dirty="0" smtClean="0"/>
-            <a:t>CVS, Box</a:t>
+            <a:t>SVN, CVS, Box</a:t>
           </a:r>
           <a:endParaRPr lang="en-US" dirty="0"/>
         </a:p>
@@ -14408,11 +14453,7 @@
           </a:pPr>
           <a:r>
             <a:rPr lang="en-US" sz="1800" kern="1200" dirty="0" smtClean="0"/>
-            <a:t>SVN, </a:t>
-          </a:r>
-          <a:r>
-            <a:rPr lang="en-US" sz="1800" kern="1200" dirty="0" smtClean="0"/>
-            <a:t>CVS, Box</a:t>
+            <a:t>SVN, CVS, Box</a:t>
           </a:r>
           <a:endParaRPr lang="en-US" sz="1800" kern="1200" dirty="0"/>
         </a:p>
@@ -28700,7 +28741,7 @@
           <a:p>
             <a:fld id="{BF0AF1F5-6961-7942-8456-A0D87943A4B5}" type="datetimeFigureOut">
               <a:rPr lang="en-US" smtClean="0"/>
-              <a:t>2/10/16</a:t>
+              <a:t>2/11/16</a:t>
             </a:fld>
             <a:endParaRPr lang="en-US"/>
           </a:p>
@@ -29233,7 +29274,7 @@
           <a:p>
             <a:fld id="{4CFD9AF2-1E1C-F341-9DA3-881CB368E7E2}" type="datetimeFigureOut">
               <a:rPr lang="en-US" smtClean="0"/>
-              <a:t>2/10/16</a:t>
+              <a:t>2/11/16</a:t>
             </a:fld>
             <a:endParaRPr lang="en-US"/>
           </a:p>
@@ -29403,7 +29444,7 @@
           <a:p>
             <a:fld id="{4CFD9AF2-1E1C-F341-9DA3-881CB368E7E2}" type="datetimeFigureOut">
               <a:rPr lang="en-US" smtClean="0"/>
-              <a:t>2/10/16</a:t>
+              <a:t>2/11/16</a:t>
             </a:fld>
             <a:endParaRPr lang="en-US"/>
           </a:p>
@@ -29583,7 +29624,7 @@
           <a:p>
             <a:fld id="{4CFD9AF2-1E1C-F341-9DA3-881CB368E7E2}" type="datetimeFigureOut">
               <a:rPr lang="en-US" smtClean="0"/>
-              <a:t>2/10/16</a:t>
+              <a:t>2/11/16</a:t>
             </a:fld>
             <a:endParaRPr lang="en-US"/>
           </a:p>
@@ -29753,7 +29794,7 @@
           <a:p>
             <a:fld id="{4CFD9AF2-1E1C-F341-9DA3-881CB368E7E2}" type="datetimeFigureOut">
               <a:rPr lang="en-US" smtClean="0"/>
-              <a:t>2/10/16</a:t>
+              <a:t>2/11/16</a:t>
             </a:fld>
             <a:endParaRPr lang="en-US"/>
           </a:p>
@@ -29999,7 +30040,7 @@
           <a:p>
             <a:fld id="{4CFD9AF2-1E1C-F341-9DA3-881CB368E7E2}" type="datetimeFigureOut">
               <a:rPr lang="en-US" smtClean="0"/>
-              <a:t>2/10/16</a:t>
+              <a:t>2/11/16</a:t>
             </a:fld>
             <a:endParaRPr lang="en-US"/>
           </a:p>
@@ -30287,7 +30328,7 @@
           <a:p>
             <a:fld id="{4CFD9AF2-1E1C-F341-9DA3-881CB368E7E2}" type="datetimeFigureOut">
               <a:rPr lang="en-US" smtClean="0"/>
-              <a:t>2/10/16</a:t>
+              <a:t>2/11/16</a:t>
             </a:fld>
             <a:endParaRPr lang="en-US"/>
           </a:p>
@@ -30709,7 +30750,7 @@
           <a:p>
             <a:fld id="{4CFD9AF2-1E1C-F341-9DA3-881CB368E7E2}" type="datetimeFigureOut">
               <a:rPr lang="en-US" smtClean="0"/>
-              <a:t>2/10/16</a:t>
+              <a:t>2/11/16</a:t>
             </a:fld>
             <a:endParaRPr lang="en-US"/>
           </a:p>
@@ -30827,7 +30868,7 @@
           <a:p>
             <a:fld id="{4CFD9AF2-1E1C-F341-9DA3-881CB368E7E2}" type="datetimeFigureOut">
               <a:rPr lang="en-US" smtClean="0"/>
-              <a:t>2/10/16</a:t>
+              <a:t>2/11/16</a:t>
             </a:fld>
             <a:endParaRPr lang="en-US"/>
           </a:p>
@@ -30922,7 +30963,7 @@
           <a:p>
             <a:fld id="{4CFD9AF2-1E1C-F341-9DA3-881CB368E7E2}" type="datetimeFigureOut">
               <a:rPr lang="en-US" smtClean="0"/>
-              <a:t>2/10/16</a:t>
+              <a:t>2/11/16</a:t>
             </a:fld>
             <a:endParaRPr lang="en-US"/>
           </a:p>
@@ -31199,7 +31240,7 @@
           <a:p>
             <a:fld id="{4CFD9AF2-1E1C-F341-9DA3-881CB368E7E2}" type="datetimeFigureOut">
               <a:rPr lang="en-US" smtClean="0"/>
-              <a:t>2/10/16</a:t>
+              <a:t>2/11/16</a:t>
             </a:fld>
             <a:endParaRPr lang="en-US"/>
           </a:p>
@@ -31456,7 +31497,7 @@
           <a:p>
             <a:fld id="{4CFD9AF2-1E1C-F341-9DA3-881CB368E7E2}" type="datetimeFigureOut">
               <a:rPr lang="en-US" smtClean="0"/>
-              <a:t>2/10/16</a:t>
+              <a:t>2/11/16</a:t>
             </a:fld>
             <a:endParaRPr lang="en-US"/>
           </a:p>
@@ -31699,7 +31740,7 @@
           <a:p>
             <a:fld id="{4CFD9AF2-1E1C-F341-9DA3-881CB368E7E2}" type="datetimeFigureOut">
               <a:rPr lang="en-US" smtClean="0"/>
-              <a:t>2/10/16</a:t>
+              <a:t>2/11/16</a:t>
             </a:fld>
             <a:endParaRPr lang="en-US"/>
           </a:p>
@@ -32838,18 +32879,7 @@
                   </a:schemeClr>
                 </a:solidFill>
               </a:rPr>
-              <a:t>Branch and merge is </a:t>
-            </a:r>
-            <a:r>
-              <a:rPr lang="en-US" sz="1200" dirty="0" smtClean="0">
-                <a:solidFill>
-                  <a:schemeClr val="tx1">
-                    <a:lumMod val="75000"/>
-                    <a:lumOff val="25000"/>
-                  </a:schemeClr>
-                </a:solidFill>
-              </a:rPr>
-              <a:t>project wide</a:t>
+              <a:t>Branch and merge is project wide</a:t>
             </a:r>
             <a:endParaRPr lang="en-US" sz="1200" dirty="0">
               <a:solidFill>
@@ -32922,11 +32952,7 @@
             </a:r>
             <a:r>
               <a:rPr lang="en-US" dirty="0" smtClean="0"/>
-              <a:t> Solves A Number of </a:t>
-            </a:r>
-            <a:r>
-              <a:rPr lang="en-US" dirty="0" smtClean="0"/>
-              <a:t>Problems</a:t>
+              <a:t> Solves A Number of Problems</a:t>
             </a:r>
             <a:endParaRPr lang="en-US" dirty="0"/>
           </a:p>
@@ -32985,7 +33011,19 @@
           <a:p>
             <a:r>
               <a:rPr lang="en-US" dirty="0" smtClean="0"/>
-              <a:t>Merging multiple branches (often)</a:t>
+              <a:t>Merging multiple </a:t>
+            </a:r>
+            <a:r>
+              <a:rPr lang="en-US" smtClean="0"/>
+              <a:t>branches </a:t>
+            </a:r>
+            <a:r>
+              <a:rPr lang="en-US" smtClean="0"/>
+              <a:t>(</a:t>
+            </a:r>
+            <a:r>
+              <a:rPr lang="en-US" dirty="0" smtClean="0"/>
+              <a:t>often)</a:t>
             </a:r>
           </a:p>
           <a:p>
@@ -33003,11 +33041,7 @@
           <a:p>
             <a:r>
               <a:rPr lang="en-US" dirty="0" smtClean="0"/>
-              <a:t>URIs to different </a:t>
-            </a:r>
-            <a:r>
-              <a:rPr lang="en-US" dirty="0" smtClean="0"/>
-              <a:t>versions and Tags</a:t>
+              <a:t>URIs to different versions and Tags</a:t>
             </a:r>
             <a:endParaRPr lang="en-US" dirty="0"/>
           </a:p>
@@ -33560,15 +33594,7 @@
           <a:p>
             <a:r>
               <a:rPr lang="en-US" sz="3600" dirty="0" smtClean="0"/>
-              <a:t>A Multi</a:t>
-            </a:r>
-            <a:r>
-              <a:rPr lang="en-US" sz="3600" dirty="0" smtClean="0"/>
-              <a:t>-User Multi-Document </a:t>
-            </a:r>
-            <a:r>
-              <a:rPr lang="en-US" sz="3600" dirty="0" smtClean="0"/>
-              <a:t>Lifecycle</a:t>
+              <a:t>A Multi-User Multi-Document Lifecycle</a:t>
             </a:r>
             <a:endParaRPr lang="en-US" sz="3600" dirty="0"/>
           </a:p>
@@ -33695,8 +33721,8 @@
         </p:nvSpPr>
         <p:spPr>
           <a:xfrm>
-            <a:off x="457200" y="1600200"/>
-            <a:ext cx="3657600" cy="4525963"/>
+            <a:off x="381508" y="2270931"/>
+            <a:ext cx="3657600" cy="4230918"/>
           </a:xfrm>
         </p:spPr>
         <p:txBody>
@@ -33752,11 +33778,7 @@
           <a:p>
             <a:r>
               <a:rPr lang="en-US" dirty="0" smtClean="0"/>
-              <a:t>Locks are </a:t>
-            </a:r>
-            <a:r>
-              <a:rPr lang="en-US" dirty="0" smtClean="0"/>
-              <a:t>annoying</a:t>
+              <a:t>Locks are annoying</a:t>
             </a:r>
           </a:p>
           <a:p>
@@ -33772,7 +33794,6 @@
               <a:rPr lang="en-US" dirty="0" smtClean="0"/>
               <a:t>Slows work</a:t>
             </a:r>
-            <a:endParaRPr lang="en-US" dirty="0" smtClean="0"/>
           </a:p>
           <a:p>
             <a:endParaRPr lang="en-US" dirty="0"/>
@@ -33793,8 +33814,8 @@
         </p:nvGrpSpPr>
         <p:grpSpPr>
           <a:xfrm>
-            <a:off x="5070686" y="2087569"/>
-            <a:ext cx="3716641" cy="4466134"/>
+            <a:off x="5070686" y="2270931"/>
+            <a:ext cx="3716641" cy="4282772"/>
             <a:chOff x="4579394" y="1371600"/>
             <a:chExt cx="4474446" cy="5257800"/>
           </a:xfrm>
@@ -36614,11 +36635,7 @@
           <a:p>
             <a:r>
               <a:rPr lang="en-US" dirty="0" smtClean="0"/>
-              <a:t>Alternative </a:t>
-            </a:r>
-            <a:r>
-              <a:rPr lang="en-US" dirty="0" smtClean="0"/>
-              <a:t>Solutions</a:t>
+              <a:t>Alternative Solutions</a:t>
             </a:r>
             <a:endParaRPr lang="en-US" dirty="0"/>
           </a:p>
@@ -36690,7 +36707,6 @@
               <a:rPr lang="en-US" dirty="0" smtClean="0"/>
               <a:t>Versioning For documents</a:t>
             </a:r>
-            <a:endParaRPr lang="en-US" dirty="0" smtClean="0"/>
           </a:p>
           <a:p>
             <a:pPr lvl="1"/>
@@ -37270,14 +37286,6 @@
             <a:r>
               <a:rPr lang="en-US" dirty="0" err="1" smtClean="0"/>
               <a:t>Git</a:t>
-            </a:r>
-            <a:r>
-              <a:rPr lang="en-US" dirty="0" smtClean="0"/>
-              <a:t> and </a:t>
-            </a:r>
-            <a:r>
-              <a:rPr lang="en-US" dirty="0" err="1" smtClean="0"/>
-              <a:t>Github</a:t>
             </a:r>
             <a:endParaRPr lang="en-US" dirty="0"/>
           </a:p>

</xml_diff>